<commit_message>
Created the plots for the optunas training and verification results
</commit_message>
<xml_diff>
--- a/chapter_06/figures/optuna_parameters_importance_feed_forward_nn.pptx
+++ b/chapter_06/figures/optuna_parameters_importance_feed_forward_nn.pptx
@@ -2,12 +2,12 @@
 <file path=ppt/presentation.xml><?xml version="1.0" encoding="utf-8"?>
 <p:presentation xmlns:a="http://schemas.openxmlformats.org/drawingml/2006/main" xmlns:r="http://schemas.openxmlformats.org/officeDocument/2006/relationships" xmlns:p="http://schemas.openxmlformats.org/presentationml/2006/main" saveSubsetFonts="1">
   <p:sldMasterIdLst>
-    <p:sldMasterId id="2147483720" r:id="rId1"/>
+    <p:sldMasterId id="2147483732" r:id="rId1"/>
   </p:sldMasterIdLst>
   <p:sldIdLst>
     <p:sldId id="256" r:id="rId2"/>
   </p:sldIdLst>
-  <p:sldSz cx="4319588" cy="3689350"/>
+  <p:sldSz cx="4140200" cy="3689350"/>
   <p:notesSz cx="6858000" cy="9144000"/>
   <p:defaultTextStyle>
     <a:defPPr>
@@ -115,8 +115,7 @@
 <file path=ppt/revisionInfo.xml><?xml version="1.0" encoding="utf-8"?>
 <p1510:revInfo xmlns:a="http://schemas.openxmlformats.org/drawingml/2006/main" xmlns:r="http://schemas.openxmlformats.org/officeDocument/2006/relationships" xmlns:p1510="http://schemas.microsoft.com/office/powerpoint/2015/10/main">
   <p1510:revLst>
-    <p1510:client id="{19698738-8B30-4641-92DF-503FDCF97601}" v="52" dt="2025-07-03T12:06:33.727"/>
-    <p1510:client id="{2F1B825C-ADF6-458B-BD90-C6378241C558}" v="29" dt="2025-07-03T15:51:47.028"/>
+    <p1510:client id="{2F1B825C-ADF6-458B-BD90-C6378241C558}" v="45" dt="2025-07-04T19:39:37.922"/>
   </p1510:revLst>
 </p1510:revInfo>
 </file>
@@ -5509,17 +5508,25 @@
   <pc:docChgLst>
     <pc:chgData name="Fatima Pillosu" userId="a6295d4dc9e22643" providerId="LiveId" clId="{2F1B825C-ADF6-458B-BD90-C6378241C558}"/>
     <pc:docChg chg="undo custSel addSld delSld modSld">
-      <pc:chgData name="Fatima Pillosu" userId="a6295d4dc9e22643" providerId="LiveId" clId="{2F1B825C-ADF6-458B-BD90-C6378241C558}" dt="2025-07-03T15:56:05.769" v="718" actId="1036"/>
+      <pc:chgData name="Fatima Pillosu" userId="a6295d4dc9e22643" providerId="LiveId" clId="{2F1B825C-ADF6-458B-BD90-C6378241C558}" dt="2025-07-04T19:53:50.988" v="1304" actId="20577"/>
       <pc:docMkLst>
         <pc:docMk/>
       </pc:docMkLst>
       <pc:sldChg chg="addSp delSp modSp mod">
-        <pc:chgData name="Fatima Pillosu" userId="a6295d4dc9e22643" providerId="LiveId" clId="{2F1B825C-ADF6-458B-BD90-C6378241C558}" dt="2025-07-03T15:56:05.769" v="718" actId="1036"/>
+        <pc:chgData name="Fatima Pillosu" userId="a6295d4dc9e22643" providerId="LiveId" clId="{2F1B825C-ADF6-458B-BD90-C6378241C558}" dt="2025-07-04T19:53:50.988" v="1304" actId="20577"/>
         <pc:sldMkLst>
           <pc:docMk/>
           <pc:sldMk cId="1077421182" sldId="256"/>
         </pc:sldMkLst>
         <pc:spChg chg="add del mod">
+          <ac:chgData name="Fatima Pillosu" userId="a6295d4dc9e22643" providerId="LiveId" clId="{2F1B825C-ADF6-458B-BD90-C6378241C558}" dt="2025-07-04T16:36:48.441" v="1131" actId="478"/>
+          <ac:spMkLst>
+            <pc:docMk/>
+            <pc:sldMk cId="1077421182" sldId="256"/>
+            <ac:spMk id="2" creationId="{FC0538FC-8EDC-6445-6648-DBA3300096BF}"/>
+          </ac:spMkLst>
+        </pc:spChg>
+        <pc:spChg chg="add del mod">
           <ac:chgData name="Fatima Pillosu" userId="a6295d4dc9e22643" providerId="LiveId" clId="{2F1B825C-ADF6-458B-BD90-C6378241C558}" dt="2025-07-03T15:08:17.381" v="407" actId="21"/>
           <ac:spMkLst>
             <pc:docMk/>
@@ -5536,11 +5543,27 @@
           </ac:spMkLst>
         </pc:spChg>
         <pc:spChg chg="add del mod">
+          <ac:chgData name="Fatima Pillosu" userId="a6295d4dc9e22643" providerId="LiveId" clId="{2F1B825C-ADF6-458B-BD90-C6378241C558}" dt="2025-07-04T19:39:23.065" v="1293" actId="21"/>
+          <ac:spMkLst>
+            <pc:docMk/>
+            <pc:sldMk cId="1077421182" sldId="256"/>
+            <ac:spMk id="4" creationId="{EF33B4CF-E544-0981-3F38-6470DAE498C6}"/>
+          </ac:spMkLst>
+        </pc:spChg>
+        <pc:spChg chg="add del mod">
           <ac:chgData name="Fatima Pillosu" userId="a6295d4dc9e22643" providerId="LiveId" clId="{2F1B825C-ADF6-458B-BD90-C6378241C558}" dt="2025-07-03T15:08:17.381" v="407" actId="21"/>
           <ac:spMkLst>
             <pc:docMk/>
             <pc:sldMk cId="1077421182" sldId="256"/>
             <ac:spMk id="5" creationId="{C958D7B8-BC29-7508-F405-77D6128B8AFF}"/>
+          </ac:spMkLst>
+        </pc:spChg>
+        <pc:spChg chg="add del mod">
+          <ac:chgData name="Fatima Pillosu" userId="a6295d4dc9e22643" providerId="LiveId" clId="{2F1B825C-ADF6-458B-BD90-C6378241C558}" dt="2025-07-04T16:36:48.441" v="1131" actId="478"/>
+          <ac:spMkLst>
+            <pc:docMk/>
+            <pc:sldMk cId="1077421182" sldId="256"/>
+            <ac:spMk id="6" creationId="{89D6DD8B-0765-9526-044E-0191AD3B86C9}"/>
           </ac:spMkLst>
         </pc:spChg>
         <pc:spChg chg="add del mod">
@@ -5568,6 +5591,14 @@
           </ac:spMkLst>
         </pc:spChg>
         <pc:spChg chg="add del mod">
+          <ac:chgData name="Fatima Pillosu" userId="a6295d4dc9e22643" providerId="LiveId" clId="{2F1B825C-ADF6-458B-BD90-C6378241C558}" dt="2025-07-04T16:36:48.441" v="1131" actId="478"/>
+          <ac:spMkLst>
+            <pc:docMk/>
+            <pc:sldMk cId="1077421182" sldId="256"/>
+            <ac:spMk id="8" creationId="{F32D816B-EA71-3902-BBE6-4451A97DEE6C}"/>
+          </ac:spMkLst>
+        </pc:spChg>
+        <pc:spChg chg="add del mod">
           <ac:chgData name="Fatima Pillosu" userId="a6295d4dc9e22643" providerId="LiveId" clId="{2F1B825C-ADF6-458B-BD90-C6378241C558}" dt="2025-07-03T14:47:06.743" v="49" actId="478"/>
           <ac:spMkLst>
             <pc:docMk/>
@@ -5576,6 +5607,14 @@
           </ac:spMkLst>
         </pc:spChg>
         <pc:spChg chg="add del mod">
+          <ac:chgData name="Fatima Pillosu" userId="a6295d4dc9e22643" providerId="LiveId" clId="{2F1B825C-ADF6-458B-BD90-C6378241C558}" dt="2025-07-04T19:39:23.065" v="1293" actId="21"/>
+          <ac:spMkLst>
+            <pc:docMk/>
+            <pc:sldMk cId="1077421182" sldId="256"/>
+            <ac:spMk id="10" creationId="{15DA2081-548E-0ABB-3536-BB36B41A84BE}"/>
+          </ac:spMkLst>
+        </pc:spChg>
+        <pc:spChg chg="add del mod">
           <ac:chgData name="Fatima Pillosu" userId="a6295d4dc9e22643" providerId="LiveId" clId="{2F1B825C-ADF6-458B-BD90-C6378241C558}" dt="2025-07-03T14:47:03.176" v="48" actId="478"/>
           <ac:spMkLst>
             <pc:docMk/>
@@ -5600,6 +5639,14 @@
           </ac:spMkLst>
         </pc:spChg>
         <pc:spChg chg="add del mod">
+          <ac:chgData name="Fatima Pillosu" userId="a6295d4dc9e22643" providerId="LiveId" clId="{2F1B825C-ADF6-458B-BD90-C6378241C558}" dt="2025-07-04T16:36:48.441" v="1131" actId="478"/>
+          <ac:spMkLst>
+            <pc:docMk/>
+            <pc:sldMk cId="1077421182" sldId="256"/>
+            <ac:spMk id="12" creationId="{EAEA1ED9-4C5A-3053-1939-0231754EF32F}"/>
+          </ac:spMkLst>
+        </pc:spChg>
+        <pc:spChg chg="add del mod">
           <ac:chgData name="Fatima Pillosu" userId="a6295d4dc9e22643" providerId="LiveId" clId="{2F1B825C-ADF6-458B-BD90-C6378241C558}" dt="2025-07-03T14:47:03.176" v="48" actId="478"/>
           <ac:spMkLst>
             <pc:docMk/>
@@ -5613,6 +5660,54 @@
             <pc:docMk/>
             <pc:sldMk cId="1077421182" sldId="256"/>
             <ac:spMk id="14" creationId="{3B30BF9A-1321-C03F-4A56-4FE8AEB30080}"/>
+          </ac:spMkLst>
+        </pc:spChg>
+        <pc:spChg chg="add del mod">
+          <ac:chgData name="Fatima Pillosu" userId="a6295d4dc9e22643" providerId="LiveId" clId="{2F1B825C-ADF6-458B-BD90-C6378241C558}" dt="2025-07-04T16:31:52.305" v="997" actId="478"/>
+          <ac:spMkLst>
+            <pc:docMk/>
+            <pc:sldMk cId="1077421182" sldId="256"/>
+            <ac:spMk id="14" creationId="{3C677D8E-36F3-6EE2-3003-AE8F658CA61A}"/>
+          </ac:spMkLst>
+        </pc:spChg>
+        <pc:spChg chg="add del mod">
+          <ac:chgData name="Fatima Pillosu" userId="a6295d4dc9e22643" providerId="LiveId" clId="{2F1B825C-ADF6-458B-BD90-C6378241C558}" dt="2025-07-04T19:39:23.065" v="1293" actId="21"/>
+          <ac:spMkLst>
+            <pc:docMk/>
+            <pc:sldMk cId="1077421182" sldId="256"/>
+            <ac:spMk id="15" creationId="{3EFAA06B-C3D4-AAD4-ACF6-E55FA1255025}"/>
+          </ac:spMkLst>
+        </pc:spChg>
+        <pc:spChg chg="add del mod">
+          <ac:chgData name="Fatima Pillosu" userId="a6295d4dc9e22643" providerId="LiveId" clId="{2F1B825C-ADF6-458B-BD90-C6378241C558}" dt="2025-07-04T19:39:23.065" v="1293" actId="21"/>
+          <ac:spMkLst>
+            <pc:docMk/>
+            <pc:sldMk cId="1077421182" sldId="256"/>
+            <ac:spMk id="16" creationId="{38876436-DD07-918B-DDE2-4E4B4EE1525C}"/>
+          </ac:spMkLst>
+        </pc:spChg>
+        <pc:spChg chg="add del mod">
+          <ac:chgData name="Fatima Pillosu" userId="a6295d4dc9e22643" providerId="LiveId" clId="{2F1B825C-ADF6-458B-BD90-C6378241C558}" dt="2025-07-04T19:39:23.065" v="1293" actId="21"/>
+          <ac:spMkLst>
+            <pc:docMk/>
+            <pc:sldMk cId="1077421182" sldId="256"/>
+            <ac:spMk id="19" creationId="{F213C0E8-B47C-2D15-4C6A-F207529E1FE3}"/>
+          </ac:spMkLst>
+        </pc:spChg>
+        <pc:spChg chg="add del mod">
+          <ac:chgData name="Fatima Pillosu" userId="a6295d4dc9e22643" providerId="LiveId" clId="{2F1B825C-ADF6-458B-BD90-C6378241C558}" dt="2025-07-04T19:39:23.065" v="1293" actId="21"/>
+          <ac:spMkLst>
+            <pc:docMk/>
+            <pc:sldMk cId="1077421182" sldId="256"/>
+            <ac:spMk id="20" creationId="{707EDAB5-6595-3FA3-AC11-6D8719C02089}"/>
+          </ac:spMkLst>
+        </pc:spChg>
+        <pc:spChg chg="add del mod">
+          <ac:chgData name="Fatima Pillosu" userId="a6295d4dc9e22643" providerId="LiveId" clId="{2F1B825C-ADF6-458B-BD90-C6378241C558}" dt="2025-07-04T16:39:05.739" v="1184" actId="478"/>
+          <ac:spMkLst>
+            <pc:docMk/>
+            <pc:sldMk cId="1077421182" sldId="256"/>
+            <ac:spMk id="21" creationId="{F50ACE69-1A65-9772-2EF0-57241FB359FB}"/>
           </ac:spMkLst>
         </pc:spChg>
         <pc:spChg chg="add del">
@@ -5623,24 +5718,24 @@
             <ac:spMk id="23" creationId="{12CEE809-6FDB-1EB9-4D71-4E9589AFAB1D}"/>
           </ac:spMkLst>
         </pc:spChg>
-        <pc:spChg chg="add mod">
-          <ac:chgData name="Fatima Pillosu" userId="a6295d4dc9e22643" providerId="LiveId" clId="{2F1B825C-ADF6-458B-BD90-C6378241C558}" dt="2025-07-03T15:56:05.769" v="718" actId="1036"/>
+        <pc:spChg chg="add del mod">
+          <ac:chgData name="Fatima Pillosu" userId="a6295d4dc9e22643" providerId="LiveId" clId="{2F1B825C-ADF6-458B-BD90-C6378241C558}" dt="2025-07-04T19:39:23.065" v="1293" actId="21"/>
           <ac:spMkLst>
             <pc:docMk/>
             <pc:sldMk cId="1077421182" sldId="256"/>
             <ac:spMk id="24" creationId="{7CA80247-944D-A79D-DD75-278A2FC157C4}"/>
           </ac:spMkLst>
         </pc:spChg>
-        <pc:spChg chg="add mod">
-          <ac:chgData name="Fatima Pillosu" userId="a6295d4dc9e22643" providerId="LiveId" clId="{2F1B825C-ADF6-458B-BD90-C6378241C558}" dt="2025-07-03T15:08:49.244" v="417" actId="1035"/>
+        <pc:spChg chg="add del mod">
+          <ac:chgData name="Fatima Pillosu" userId="a6295d4dc9e22643" providerId="LiveId" clId="{2F1B825C-ADF6-458B-BD90-C6378241C558}" dt="2025-07-04T19:39:23.065" v="1293" actId="21"/>
           <ac:spMkLst>
             <pc:docMk/>
             <pc:sldMk cId="1077421182" sldId="256"/>
             <ac:spMk id="25" creationId="{11D0BEA8-4C97-735F-B454-B20FE6FD6664}"/>
           </ac:spMkLst>
         </pc:spChg>
-        <pc:spChg chg="add mod">
-          <ac:chgData name="Fatima Pillosu" userId="a6295d4dc9e22643" providerId="LiveId" clId="{2F1B825C-ADF6-458B-BD90-C6378241C558}" dt="2025-07-03T15:08:49.244" v="417" actId="1035"/>
+        <pc:spChg chg="add del mod">
+          <ac:chgData name="Fatima Pillosu" userId="a6295d4dc9e22643" providerId="LiveId" clId="{2F1B825C-ADF6-458B-BD90-C6378241C558}" dt="2025-07-04T19:39:23.065" v="1293" actId="21"/>
           <ac:spMkLst>
             <pc:docMk/>
             <pc:sldMk cId="1077421182" sldId="256"/>
@@ -5648,19 +5743,107 @@
           </ac:spMkLst>
         </pc:spChg>
         <pc:spChg chg="add mod">
-          <ac:chgData name="Fatima Pillosu" userId="a6295d4dc9e22643" providerId="LiveId" clId="{2F1B825C-ADF6-458B-BD90-C6378241C558}" dt="2025-07-03T15:08:49.244" v="417" actId="1035"/>
+          <ac:chgData name="Fatima Pillosu" userId="a6295d4dc9e22643" providerId="LiveId" clId="{2F1B825C-ADF6-458B-BD90-C6378241C558}" dt="2025-07-04T19:53:50.988" v="1304" actId="20577"/>
+          <ac:spMkLst>
+            <pc:docMk/>
+            <pc:sldMk cId="1077421182" sldId="256"/>
+            <ac:spMk id="29" creationId="{7CA80247-944D-A79D-DD75-278A2FC157C4}"/>
+          </ac:spMkLst>
+        </pc:spChg>
+        <pc:spChg chg="add mod">
+          <ac:chgData name="Fatima Pillosu" userId="a6295d4dc9e22643" providerId="LiveId" clId="{2F1B825C-ADF6-458B-BD90-C6378241C558}" dt="2025-07-04T19:39:51.705" v="1296" actId="1035"/>
+          <ac:spMkLst>
+            <pc:docMk/>
+            <pc:sldMk cId="1077421182" sldId="256"/>
+            <ac:spMk id="30" creationId="{11D0BEA8-4C97-735F-B454-B20FE6FD6664}"/>
+          </ac:spMkLst>
+        </pc:spChg>
+        <pc:spChg chg="add del mod">
+          <ac:chgData name="Fatima Pillosu" userId="a6295d4dc9e22643" providerId="LiveId" clId="{2F1B825C-ADF6-458B-BD90-C6378241C558}" dt="2025-07-04T19:39:23.065" v="1293" actId="21"/>
           <ac:spMkLst>
             <pc:docMk/>
             <pc:sldMk cId="1077421182" sldId="256"/>
             <ac:spMk id="31" creationId="{204795FA-B9E8-F8C0-D0CC-0DA8FCD26B47}"/>
           </ac:spMkLst>
         </pc:spChg>
-        <pc:spChg chg="add mod">
-          <ac:chgData name="Fatima Pillosu" userId="a6295d4dc9e22643" providerId="LiveId" clId="{2F1B825C-ADF6-458B-BD90-C6378241C558}" dt="2025-07-03T15:08:49.244" v="417" actId="1035"/>
+        <pc:spChg chg="add del mod">
+          <ac:chgData name="Fatima Pillosu" userId="a6295d4dc9e22643" providerId="LiveId" clId="{2F1B825C-ADF6-458B-BD90-C6378241C558}" dt="2025-07-04T19:39:23.065" v="1293" actId="21"/>
           <ac:spMkLst>
             <pc:docMk/>
             <pc:sldMk cId="1077421182" sldId="256"/>
             <ac:spMk id="32" creationId="{AEF58A4C-D7E5-1DB7-8CBA-638A2D2BAD88}"/>
+          </ac:spMkLst>
+        </pc:spChg>
+        <pc:spChg chg="add mod">
+          <ac:chgData name="Fatima Pillosu" userId="a6295d4dc9e22643" providerId="LiveId" clId="{2F1B825C-ADF6-458B-BD90-C6378241C558}" dt="2025-07-04T19:39:51.705" v="1296" actId="1035"/>
+          <ac:spMkLst>
+            <pc:docMk/>
+            <pc:sldMk cId="1077421182" sldId="256"/>
+            <ac:spMk id="33" creationId="{C958D7B8-BC29-7508-F405-77D6128B8AFF}"/>
+          </ac:spMkLst>
+        </pc:spChg>
+        <pc:spChg chg="add mod">
+          <ac:chgData name="Fatima Pillosu" userId="a6295d4dc9e22643" providerId="LiveId" clId="{2F1B825C-ADF6-458B-BD90-C6378241C558}" dt="2025-07-04T19:39:51.705" v="1296" actId="1035"/>
+          <ac:spMkLst>
+            <pc:docMk/>
+            <pc:sldMk cId="1077421182" sldId="256"/>
+            <ac:spMk id="34" creationId="{204795FA-B9E8-F8C0-D0CC-0DA8FCD26B47}"/>
+          </ac:spMkLst>
+        </pc:spChg>
+        <pc:spChg chg="add mod">
+          <ac:chgData name="Fatima Pillosu" userId="a6295d4dc9e22643" providerId="LiveId" clId="{2F1B825C-ADF6-458B-BD90-C6378241C558}" dt="2025-07-04T19:39:51.705" v="1296" actId="1035"/>
+          <ac:spMkLst>
+            <pc:docMk/>
+            <pc:sldMk cId="1077421182" sldId="256"/>
+            <ac:spMk id="35" creationId="{AEF58A4C-D7E5-1DB7-8CBA-638A2D2BAD88}"/>
+          </ac:spMkLst>
+        </pc:spChg>
+        <pc:spChg chg="add mod">
+          <ac:chgData name="Fatima Pillosu" userId="a6295d4dc9e22643" providerId="LiveId" clId="{2F1B825C-ADF6-458B-BD90-C6378241C558}" dt="2025-07-04T19:39:37.922" v="1294"/>
+          <ac:spMkLst>
+            <pc:docMk/>
+            <pc:sldMk cId="1077421182" sldId="256"/>
+            <ac:spMk id="36" creationId="{EF33B4CF-E544-0981-3F38-6470DAE498C6}"/>
+          </ac:spMkLst>
+        </pc:spChg>
+        <pc:spChg chg="add mod">
+          <ac:chgData name="Fatima Pillosu" userId="a6295d4dc9e22643" providerId="LiveId" clId="{2F1B825C-ADF6-458B-BD90-C6378241C558}" dt="2025-07-04T19:39:37.922" v="1294"/>
+          <ac:spMkLst>
+            <pc:docMk/>
+            <pc:sldMk cId="1077421182" sldId="256"/>
+            <ac:spMk id="37" creationId="{15DA2081-548E-0ABB-3536-BB36B41A84BE}"/>
+          </ac:spMkLst>
+        </pc:spChg>
+        <pc:spChg chg="add mod">
+          <ac:chgData name="Fatima Pillosu" userId="a6295d4dc9e22643" providerId="LiveId" clId="{2F1B825C-ADF6-458B-BD90-C6378241C558}" dt="2025-07-04T19:39:37.922" v="1294"/>
+          <ac:spMkLst>
+            <pc:docMk/>
+            <pc:sldMk cId="1077421182" sldId="256"/>
+            <ac:spMk id="38" creationId="{3EFAA06B-C3D4-AAD4-ACF6-E55FA1255025}"/>
+          </ac:spMkLst>
+        </pc:spChg>
+        <pc:spChg chg="add mod">
+          <ac:chgData name="Fatima Pillosu" userId="a6295d4dc9e22643" providerId="LiveId" clId="{2F1B825C-ADF6-458B-BD90-C6378241C558}" dt="2025-07-04T19:39:37.922" v="1294"/>
+          <ac:spMkLst>
+            <pc:docMk/>
+            <pc:sldMk cId="1077421182" sldId="256"/>
+            <ac:spMk id="39" creationId="{38876436-DD07-918B-DDE2-4E4B4EE1525C}"/>
+          </ac:spMkLst>
+        </pc:spChg>
+        <pc:spChg chg="add mod">
+          <ac:chgData name="Fatima Pillosu" userId="a6295d4dc9e22643" providerId="LiveId" clId="{2F1B825C-ADF6-458B-BD90-C6378241C558}" dt="2025-07-04T19:39:37.922" v="1294"/>
+          <ac:spMkLst>
+            <pc:docMk/>
+            <pc:sldMk cId="1077421182" sldId="256"/>
+            <ac:spMk id="43" creationId="{F213C0E8-B47C-2D15-4C6A-F207529E1FE3}"/>
+          </ac:spMkLst>
+        </pc:spChg>
+        <pc:spChg chg="add mod">
+          <ac:chgData name="Fatima Pillosu" userId="a6295d4dc9e22643" providerId="LiveId" clId="{2F1B825C-ADF6-458B-BD90-C6378241C558}" dt="2025-07-04T19:39:37.922" v="1294"/>
+          <ac:spMkLst>
+            <pc:docMk/>
+            <pc:sldMk cId="1077421182" sldId="256"/>
+            <ac:spMk id="44" creationId="{707EDAB5-6595-3FA3-AC11-6D8719C02089}"/>
           </ac:spMkLst>
         </pc:spChg>
         <pc:spChg chg="del mod">
@@ -5679,6 +5862,46 @@
             <ac:picMk id="2" creationId="{C2F32C17-1003-07B1-7C44-A1454C4CEFAC}"/>
           </ac:picMkLst>
         </pc:picChg>
+        <pc:picChg chg="add mod">
+          <ac:chgData name="Fatima Pillosu" userId="a6295d4dc9e22643" providerId="LiveId" clId="{2F1B825C-ADF6-458B-BD90-C6378241C558}" dt="2025-07-04T14:16:28.218" v="731"/>
+          <ac:picMkLst>
+            <pc:docMk/>
+            <pc:sldMk cId="1077421182" sldId="256"/>
+            <ac:picMk id="3" creationId="{0BCD20AB-B538-E285-DDC0-63CB677CF8D6}"/>
+          </ac:picMkLst>
+        </pc:picChg>
+        <pc:picChg chg="add del mod ord">
+          <ac:chgData name="Fatima Pillosu" userId="a6295d4dc9e22643" providerId="LiveId" clId="{2F1B825C-ADF6-458B-BD90-C6378241C558}" dt="2025-07-04T19:39:23.065" v="1293" actId="21"/>
+          <ac:picMkLst>
+            <pc:docMk/>
+            <pc:sldMk cId="1077421182" sldId="256"/>
+            <ac:picMk id="5" creationId="{955EFEE4-DE3F-D960-A050-F06EF1191405}"/>
+          </ac:picMkLst>
+        </pc:picChg>
+        <pc:picChg chg="add del mod ord">
+          <ac:chgData name="Fatima Pillosu" userId="a6295d4dc9e22643" providerId="LiveId" clId="{2F1B825C-ADF6-458B-BD90-C6378241C558}" dt="2025-07-04T19:39:23.065" v="1293" actId="21"/>
+          <ac:picMkLst>
+            <pc:docMk/>
+            <pc:sldMk cId="1077421182" sldId="256"/>
+            <ac:picMk id="7" creationId="{C6801E96-4F3E-9062-AE87-CF26450D04FE}"/>
+          </ac:picMkLst>
+        </pc:picChg>
+        <pc:picChg chg="add del mod ord">
+          <ac:chgData name="Fatima Pillosu" userId="a6295d4dc9e22643" providerId="LiveId" clId="{2F1B825C-ADF6-458B-BD90-C6378241C558}" dt="2025-07-04T19:39:23.065" v="1293" actId="21"/>
+          <ac:picMkLst>
+            <pc:docMk/>
+            <pc:sldMk cId="1077421182" sldId="256"/>
+            <ac:picMk id="9" creationId="{8263E62F-3620-920B-E91F-F4C795DA1614}"/>
+          </ac:picMkLst>
+        </pc:picChg>
+        <pc:picChg chg="add del mod ord">
+          <ac:chgData name="Fatima Pillosu" userId="a6295d4dc9e22643" providerId="LiveId" clId="{2F1B825C-ADF6-458B-BD90-C6378241C558}" dt="2025-07-04T19:39:23.065" v="1293" actId="21"/>
+          <ac:picMkLst>
+            <pc:docMk/>
+            <pc:sldMk cId="1077421182" sldId="256"/>
+            <ac:picMk id="11" creationId="{A5423CC3-A545-27EA-CA29-2FCA2505715D}"/>
+          </ac:picMkLst>
+        </pc:picChg>
         <pc:picChg chg="add del mod">
           <ac:chgData name="Fatima Pillosu" userId="a6295d4dc9e22643" providerId="LiveId" clId="{2F1B825C-ADF6-458B-BD90-C6378241C558}" dt="2025-07-03T15:08:17.381" v="407" actId="21"/>
           <ac:picMkLst>
@@ -5703,6 +5926,14 @@
             <ac:picMk id="20" creationId="{1A26CCA2-39B6-0C83-F63D-DAF1B1F1BF22}"/>
           </ac:picMkLst>
         </pc:picChg>
+        <pc:picChg chg="add mod">
+          <ac:chgData name="Fatima Pillosu" userId="a6295d4dc9e22643" providerId="LiveId" clId="{2F1B825C-ADF6-458B-BD90-C6378241C558}" dt="2025-07-04T19:39:51.705" v="1296" actId="1035"/>
+          <ac:picMkLst>
+            <pc:docMk/>
+            <pc:sldMk cId="1077421182" sldId="256"/>
+            <ac:picMk id="22" creationId="{955EFEE4-DE3F-D960-A050-F06EF1191405}"/>
+          </ac:picMkLst>
+        </pc:picChg>
         <pc:picChg chg="add del mod">
           <ac:chgData name="Fatima Pillosu" userId="a6295d4dc9e22643" providerId="LiveId" clId="{2F1B825C-ADF6-458B-BD90-C6378241C558}" dt="2025-07-03T15:08:17.381" v="407" actId="21"/>
           <ac:picMkLst>
@@ -5712,7 +5943,23 @@
           </ac:picMkLst>
         </pc:picChg>
         <pc:picChg chg="add mod">
-          <ac:chgData name="Fatima Pillosu" userId="a6295d4dc9e22643" providerId="LiveId" clId="{2F1B825C-ADF6-458B-BD90-C6378241C558}" dt="2025-07-03T15:08:49.244" v="417" actId="1035"/>
+          <ac:chgData name="Fatima Pillosu" userId="a6295d4dc9e22643" providerId="LiveId" clId="{2F1B825C-ADF6-458B-BD90-C6378241C558}" dt="2025-07-04T19:39:51.705" v="1296" actId="1035"/>
+          <ac:picMkLst>
+            <pc:docMk/>
+            <pc:sldMk cId="1077421182" sldId="256"/>
+            <ac:picMk id="23" creationId="{C6801E96-4F3E-9062-AE87-CF26450D04FE}"/>
+          </ac:picMkLst>
+        </pc:picChg>
+        <pc:picChg chg="add mod">
+          <ac:chgData name="Fatima Pillosu" userId="a6295d4dc9e22643" providerId="LiveId" clId="{2F1B825C-ADF6-458B-BD90-C6378241C558}" dt="2025-07-04T19:39:51.705" v="1296" actId="1035"/>
+          <ac:picMkLst>
+            <pc:docMk/>
+            <pc:sldMk cId="1077421182" sldId="256"/>
+            <ac:picMk id="27" creationId="{8263E62F-3620-920B-E91F-F4C795DA1614}"/>
+          </ac:picMkLst>
+        </pc:picChg>
+        <pc:picChg chg="add del mod">
+          <ac:chgData name="Fatima Pillosu" userId="a6295d4dc9e22643" providerId="LiveId" clId="{2F1B825C-ADF6-458B-BD90-C6378241C558}" dt="2025-07-04T14:18:11.528" v="761" actId="478"/>
           <ac:picMkLst>
             <pc:docMk/>
             <pc:sldMk cId="1077421182" sldId="256"/>
@@ -5720,29 +5967,93 @@
           </ac:picMkLst>
         </pc:picChg>
         <pc:picChg chg="add mod">
-          <ac:chgData name="Fatima Pillosu" userId="a6295d4dc9e22643" providerId="LiveId" clId="{2F1B825C-ADF6-458B-BD90-C6378241C558}" dt="2025-07-03T15:08:49.244" v="417" actId="1035"/>
+          <ac:chgData name="Fatima Pillosu" userId="a6295d4dc9e22643" providerId="LiveId" clId="{2F1B825C-ADF6-458B-BD90-C6378241C558}" dt="2025-07-04T19:39:51.705" v="1296" actId="1035"/>
+          <ac:picMkLst>
+            <pc:docMk/>
+            <pc:sldMk cId="1077421182" sldId="256"/>
+            <ac:picMk id="28" creationId="{A5423CC3-A545-27EA-CA29-2FCA2505715D}"/>
+          </ac:picMkLst>
+        </pc:picChg>
+        <pc:picChg chg="add del mod">
+          <ac:chgData name="Fatima Pillosu" userId="a6295d4dc9e22643" providerId="LiveId" clId="{2F1B825C-ADF6-458B-BD90-C6378241C558}" dt="2025-07-04T14:18:11.528" v="761" actId="478"/>
           <ac:picMkLst>
             <pc:docMk/>
             <pc:sldMk cId="1077421182" sldId="256"/>
             <ac:picMk id="28" creationId="{CB5D4612-C726-B730-FDD5-73CC7555783F}"/>
           </ac:picMkLst>
         </pc:picChg>
-        <pc:picChg chg="add mod">
-          <ac:chgData name="Fatima Pillosu" userId="a6295d4dc9e22643" providerId="LiveId" clId="{2F1B825C-ADF6-458B-BD90-C6378241C558}" dt="2025-07-03T15:08:49.244" v="417" actId="1035"/>
+        <pc:picChg chg="add del mod">
+          <ac:chgData name="Fatima Pillosu" userId="a6295d4dc9e22643" providerId="LiveId" clId="{2F1B825C-ADF6-458B-BD90-C6378241C558}" dt="2025-07-04T14:18:11.528" v="761" actId="478"/>
           <ac:picMkLst>
             <pc:docMk/>
             <pc:sldMk cId="1077421182" sldId="256"/>
             <ac:picMk id="29" creationId="{1A26CCA2-39B6-0C83-F63D-DAF1B1F1BF22}"/>
           </ac:picMkLst>
         </pc:picChg>
-        <pc:picChg chg="add mod">
-          <ac:chgData name="Fatima Pillosu" userId="a6295d4dc9e22643" providerId="LiveId" clId="{2F1B825C-ADF6-458B-BD90-C6378241C558}" dt="2025-07-03T15:08:49.244" v="417" actId="1035"/>
+        <pc:picChg chg="add del mod">
+          <ac:chgData name="Fatima Pillosu" userId="a6295d4dc9e22643" providerId="LiveId" clId="{2F1B825C-ADF6-458B-BD90-C6378241C558}" dt="2025-07-04T14:18:11.528" v="761" actId="478"/>
           <ac:picMkLst>
             <pc:docMk/>
             <pc:sldMk cId="1077421182" sldId="256"/>
             <ac:picMk id="30" creationId="{F702E16D-2E2F-BD83-3E7E-3F35D456A651}"/>
           </ac:picMkLst>
         </pc:picChg>
+        <pc:cxnChg chg="add del mod ord">
+          <ac:chgData name="Fatima Pillosu" userId="a6295d4dc9e22643" providerId="LiveId" clId="{2F1B825C-ADF6-458B-BD90-C6378241C558}" dt="2025-07-04T19:39:23.065" v="1293" actId="21"/>
+          <ac:cxnSpMkLst>
+            <pc:docMk/>
+            <pc:sldMk cId="1077421182" sldId="256"/>
+            <ac:cxnSpMk id="3" creationId="{1B0ED484-5AE6-7483-5A00-30E83FFCB513}"/>
+          </ac:cxnSpMkLst>
+        </pc:cxnChg>
+        <pc:cxnChg chg="add del mod">
+          <ac:chgData name="Fatima Pillosu" userId="a6295d4dc9e22643" providerId="LiveId" clId="{2F1B825C-ADF6-458B-BD90-C6378241C558}" dt="2025-07-04T16:31:50.737" v="996" actId="478"/>
+          <ac:cxnSpMkLst>
+            <pc:docMk/>
+            <pc:sldMk cId="1077421182" sldId="256"/>
+            <ac:cxnSpMk id="13" creationId="{0C06153D-1F19-96E9-B6CD-EFFD49EB2A3B}"/>
+          </ac:cxnSpMkLst>
+        </pc:cxnChg>
+        <pc:cxnChg chg="add del mod">
+          <ac:chgData name="Fatima Pillosu" userId="a6295d4dc9e22643" providerId="LiveId" clId="{2F1B825C-ADF6-458B-BD90-C6378241C558}" dt="2025-07-04T19:39:23.065" v="1293" actId="21"/>
+          <ac:cxnSpMkLst>
+            <pc:docMk/>
+            <pc:sldMk cId="1077421182" sldId="256"/>
+            <ac:cxnSpMk id="17" creationId="{EC9F1E64-F616-B34C-EE8A-8C4F34301F3C}"/>
+          </ac:cxnSpMkLst>
+        </pc:cxnChg>
+        <pc:cxnChg chg="add del mod">
+          <ac:chgData name="Fatima Pillosu" userId="a6295d4dc9e22643" providerId="LiveId" clId="{2F1B825C-ADF6-458B-BD90-C6378241C558}" dt="2025-07-04T19:39:23.065" v="1293" actId="21"/>
+          <ac:cxnSpMkLst>
+            <pc:docMk/>
+            <pc:sldMk cId="1077421182" sldId="256"/>
+            <ac:cxnSpMk id="18" creationId="{851394A0-0089-69D5-A0FA-C1C27FBBFB5D}"/>
+          </ac:cxnSpMkLst>
+        </pc:cxnChg>
+        <pc:cxnChg chg="add mod">
+          <ac:chgData name="Fatima Pillosu" userId="a6295d4dc9e22643" providerId="LiveId" clId="{2F1B825C-ADF6-458B-BD90-C6378241C558}" dt="2025-07-04T19:39:37.922" v="1294"/>
+          <ac:cxnSpMkLst>
+            <pc:docMk/>
+            <pc:sldMk cId="1077421182" sldId="256"/>
+            <ac:cxnSpMk id="40" creationId="{1B0ED484-5AE6-7483-5A00-30E83FFCB513}"/>
+          </ac:cxnSpMkLst>
+        </pc:cxnChg>
+        <pc:cxnChg chg="add mod">
+          <ac:chgData name="Fatima Pillosu" userId="a6295d4dc9e22643" providerId="LiveId" clId="{2F1B825C-ADF6-458B-BD90-C6378241C558}" dt="2025-07-04T19:39:37.922" v="1294"/>
+          <ac:cxnSpMkLst>
+            <pc:docMk/>
+            <pc:sldMk cId="1077421182" sldId="256"/>
+            <ac:cxnSpMk id="41" creationId="{EC9F1E64-F616-B34C-EE8A-8C4F34301F3C}"/>
+          </ac:cxnSpMkLst>
+        </pc:cxnChg>
+        <pc:cxnChg chg="add mod">
+          <ac:chgData name="Fatima Pillosu" userId="a6295d4dc9e22643" providerId="LiveId" clId="{2F1B825C-ADF6-458B-BD90-C6378241C558}" dt="2025-07-04T19:39:37.922" v="1294"/>
+          <ac:cxnSpMkLst>
+            <pc:docMk/>
+            <pc:sldMk cId="1077421182" sldId="256"/>
+            <ac:cxnSpMk id="42" creationId="{851394A0-0089-69D5-A0FA-C1C27FBBFB5D}"/>
+          </ac:cxnSpMkLst>
+        </pc:cxnChg>
       </pc:sldChg>
       <pc:sldChg chg="delSp add del mod">
         <pc:chgData name="Fatima Pillosu" userId="a6295d4dc9e22643" providerId="LiveId" clId="{2F1B825C-ADF6-458B-BD90-C6378241C558}" dt="2025-07-03T15:07:05.131" v="398" actId="47"/>
@@ -6239,15 +6550,15 @@
         </p:nvSpPr>
         <p:spPr>
           <a:xfrm>
-            <a:off x="323969" y="603790"/>
-            <a:ext cx="3671650" cy="1284440"/>
+            <a:off x="310515" y="603790"/>
+            <a:ext cx="3519170" cy="1284440"/>
           </a:xfrm>
         </p:spPr>
         <p:txBody>
           <a:bodyPr anchor="b"/>
           <a:lstStyle>
             <a:lvl1pPr algn="ctr">
-              <a:defRPr sz="2834"/>
+              <a:defRPr sz="2717"/>
             </a:lvl1pPr>
           </a:lstStyle>
           <a:p>
@@ -6271,8 +6582,8 @@
         </p:nvSpPr>
         <p:spPr>
           <a:xfrm>
-            <a:off x="539949" y="1937763"/>
-            <a:ext cx="3239691" cy="890739"/>
+            <a:off x="517525" y="1937763"/>
+            <a:ext cx="3105150" cy="890739"/>
           </a:xfrm>
         </p:spPr>
         <p:txBody>
@@ -6280,39 +6591,39 @@
           <a:lstStyle>
             <a:lvl1pPr marL="0" indent="0" algn="ctr">
               <a:buNone/>
-              <a:defRPr sz="1134"/>
+              <a:defRPr sz="1087"/>
             </a:lvl1pPr>
-            <a:lvl2pPr marL="215981" indent="0" algn="ctr">
+            <a:lvl2pPr marL="207020" indent="0" algn="ctr">
               <a:buNone/>
-              <a:defRPr sz="945"/>
+              <a:defRPr sz="906"/>
             </a:lvl2pPr>
-            <a:lvl3pPr marL="431963" indent="0" algn="ctr">
+            <a:lvl3pPr marL="414040" indent="0" algn="ctr">
               <a:buNone/>
-              <a:defRPr sz="850"/>
+              <a:defRPr sz="815"/>
             </a:lvl3pPr>
-            <a:lvl4pPr marL="647944" indent="0" algn="ctr">
+            <a:lvl4pPr marL="621060" indent="0" algn="ctr">
               <a:buNone/>
-              <a:defRPr sz="756"/>
+              <a:defRPr sz="724"/>
             </a:lvl4pPr>
-            <a:lvl5pPr marL="863925" indent="0" algn="ctr">
+            <a:lvl5pPr marL="828081" indent="0" algn="ctr">
               <a:buNone/>
-              <a:defRPr sz="756"/>
+              <a:defRPr sz="724"/>
             </a:lvl5pPr>
-            <a:lvl6pPr marL="1079906" indent="0" algn="ctr">
+            <a:lvl6pPr marL="1035101" indent="0" algn="ctr">
               <a:buNone/>
-              <a:defRPr sz="756"/>
+              <a:defRPr sz="724"/>
             </a:lvl6pPr>
-            <a:lvl7pPr marL="1295888" indent="0" algn="ctr">
+            <a:lvl7pPr marL="1242121" indent="0" algn="ctr">
               <a:buNone/>
-              <a:defRPr sz="756"/>
+              <a:defRPr sz="724"/>
             </a:lvl7pPr>
-            <a:lvl8pPr marL="1511869" indent="0" algn="ctr">
+            <a:lvl8pPr marL="1449141" indent="0" algn="ctr">
               <a:buNone/>
-              <a:defRPr sz="756"/>
+              <a:defRPr sz="724"/>
             </a:lvl8pPr>
-            <a:lvl9pPr marL="1727850" indent="0" algn="ctr">
+            <a:lvl9pPr marL="1656161" indent="0" algn="ctr">
               <a:buNone/>
-              <a:defRPr sz="756"/>
+              <a:defRPr sz="724"/>
             </a:lvl9pPr>
           </a:lstStyle>
           <a:p>
@@ -6341,7 +6652,7 @@
           <a:p>
             <a:fld id="{F0820250-0589-45C6-A87F-3E34BBC48915}" type="datetimeFigureOut">
               <a:rPr lang="en-GB" smtClean="0"/>
-              <a:t>03/07/2025</a:t>
+              <a:t>04/07/2025</a:t>
             </a:fld>
             <a:endParaRPr lang="en-GB"/>
           </a:p>
@@ -6392,7 +6703,7 @@
     </p:spTree>
     <p:extLst>
       <p:ext uri="{BB962C8B-B14F-4D97-AF65-F5344CB8AC3E}">
-        <p14:creationId xmlns:p14="http://schemas.microsoft.com/office/powerpoint/2010/main" val="188501833"/>
+        <p14:creationId xmlns:p14="http://schemas.microsoft.com/office/powerpoint/2010/main" val="1660229041"/>
       </p:ext>
     </p:extLst>
   </p:cSld>
@@ -6511,7 +6822,7 @@
           <a:p>
             <a:fld id="{F0820250-0589-45C6-A87F-3E34BBC48915}" type="datetimeFigureOut">
               <a:rPr lang="en-GB" smtClean="0"/>
-              <a:t>03/07/2025</a:t>
+              <a:t>04/07/2025</a:t>
             </a:fld>
             <a:endParaRPr lang="en-GB"/>
           </a:p>
@@ -6562,7 +6873,7 @@
     </p:spTree>
     <p:extLst>
       <p:ext uri="{BB962C8B-B14F-4D97-AF65-F5344CB8AC3E}">
-        <p14:creationId xmlns:p14="http://schemas.microsoft.com/office/powerpoint/2010/main" val="3369405"/>
+        <p14:creationId xmlns:p14="http://schemas.microsoft.com/office/powerpoint/2010/main" val="1084578134"/>
       </p:ext>
     </p:extLst>
   </p:cSld>
@@ -6601,8 +6912,8 @@
         </p:nvSpPr>
         <p:spPr>
           <a:xfrm>
-            <a:off x="3091205" y="196424"/>
-            <a:ext cx="931411" cy="3126554"/>
+            <a:off x="2962831" y="196424"/>
+            <a:ext cx="892731" cy="3126554"/>
           </a:xfrm>
         </p:spPr>
         <p:txBody>
@@ -6629,8 +6940,8 @@
         </p:nvSpPr>
         <p:spPr>
           <a:xfrm>
-            <a:off x="296972" y="196424"/>
-            <a:ext cx="2740239" cy="3126554"/>
+            <a:off x="284639" y="196424"/>
+            <a:ext cx="2626439" cy="3126554"/>
           </a:xfrm>
         </p:spPr>
         <p:txBody>
@@ -6691,7 +7002,7 @@
           <a:p>
             <a:fld id="{F0820250-0589-45C6-A87F-3E34BBC48915}" type="datetimeFigureOut">
               <a:rPr lang="en-GB" smtClean="0"/>
-              <a:t>03/07/2025</a:t>
+              <a:t>04/07/2025</a:t>
             </a:fld>
             <a:endParaRPr lang="en-GB"/>
           </a:p>
@@ -6742,7 +7053,7 @@
     </p:spTree>
     <p:extLst>
       <p:ext uri="{BB962C8B-B14F-4D97-AF65-F5344CB8AC3E}">
-        <p14:creationId xmlns:p14="http://schemas.microsoft.com/office/powerpoint/2010/main" val="3823829807"/>
+        <p14:creationId xmlns:p14="http://schemas.microsoft.com/office/powerpoint/2010/main" val="45578276"/>
       </p:ext>
     </p:extLst>
   </p:cSld>
@@ -6861,7 +7172,7 @@
           <a:p>
             <a:fld id="{F0820250-0589-45C6-A87F-3E34BBC48915}" type="datetimeFigureOut">
               <a:rPr lang="en-GB" smtClean="0"/>
-              <a:t>03/07/2025</a:t>
+              <a:t>04/07/2025</a:t>
             </a:fld>
             <a:endParaRPr lang="en-GB"/>
           </a:p>
@@ -6912,7 +7223,7 @@
     </p:spTree>
     <p:extLst>
       <p:ext uri="{BB962C8B-B14F-4D97-AF65-F5344CB8AC3E}">
-        <p14:creationId xmlns:p14="http://schemas.microsoft.com/office/powerpoint/2010/main" val="1423530715"/>
+        <p14:creationId xmlns:p14="http://schemas.microsoft.com/office/powerpoint/2010/main" val="1172451608"/>
       </p:ext>
     </p:extLst>
   </p:cSld>
@@ -6951,15 +7262,15 @@
         </p:nvSpPr>
         <p:spPr>
           <a:xfrm>
-            <a:off x="294722" y="919776"/>
-            <a:ext cx="3725645" cy="1534667"/>
+            <a:off x="282482" y="919776"/>
+            <a:ext cx="3570923" cy="1534667"/>
           </a:xfrm>
         </p:spPr>
         <p:txBody>
           <a:bodyPr anchor="b"/>
           <a:lstStyle>
             <a:lvl1pPr>
-              <a:defRPr sz="2834"/>
+              <a:defRPr sz="2717"/>
             </a:lvl1pPr>
           </a:lstStyle>
           <a:p>
@@ -6983,8 +7294,8 @@
         </p:nvSpPr>
         <p:spPr>
           <a:xfrm>
-            <a:off x="294722" y="2468962"/>
-            <a:ext cx="3725645" cy="807045"/>
+            <a:off x="282482" y="2468962"/>
+            <a:ext cx="3570923" cy="807045"/>
           </a:xfrm>
         </p:spPr>
         <p:txBody>
@@ -6992,7 +7303,7 @@
           <a:lstStyle>
             <a:lvl1pPr marL="0" indent="0">
               <a:buNone/>
-              <a:defRPr sz="1134">
+              <a:defRPr sz="1087">
                 <a:solidFill>
                   <a:schemeClr val="tx1">
                     <a:tint val="82000"/>
@@ -7000,9 +7311,9 @@
                 </a:solidFill>
               </a:defRPr>
             </a:lvl1pPr>
-            <a:lvl2pPr marL="215981" indent="0">
+            <a:lvl2pPr marL="207020" indent="0">
               <a:buNone/>
-              <a:defRPr sz="945">
+              <a:defRPr sz="906">
                 <a:solidFill>
                   <a:schemeClr val="tx1">
                     <a:tint val="82000"/>
@@ -7010,9 +7321,9 @@
                 </a:solidFill>
               </a:defRPr>
             </a:lvl2pPr>
-            <a:lvl3pPr marL="431963" indent="0">
+            <a:lvl3pPr marL="414040" indent="0">
               <a:buNone/>
-              <a:defRPr sz="850">
+              <a:defRPr sz="815">
                 <a:solidFill>
                   <a:schemeClr val="tx1">
                     <a:tint val="82000"/>
@@ -7020,9 +7331,9 @@
                 </a:solidFill>
               </a:defRPr>
             </a:lvl3pPr>
-            <a:lvl4pPr marL="647944" indent="0">
+            <a:lvl4pPr marL="621060" indent="0">
               <a:buNone/>
-              <a:defRPr sz="756">
+              <a:defRPr sz="724">
                 <a:solidFill>
                   <a:schemeClr val="tx1">
                     <a:tint val="82000"/>
@@ -7030,9 +7341,9 @@
                 </a:solidFill>
               </a:defRPr>
             </a:lvl4pPr>
-            <a:lvl5pPr marL="863925" indent="0">
+            <a:lvl5pPr marL="828081" indent="0">
               <a:buNone/>
-              <a:defRPr sz="756">
+              <a:defRPr sz="724">
                 <a:solidFill>
                   <a:schemeClr val="tx1">
                     <a:tint val="82000"/>
@@ -7040,9 +7351,9 @@
                 </a:solidFill>
               </a:defRPr>
             </a:lvl5pPr>
-            <a:lvl6pPr marL="1079906" indent="0">
+            <a:lvl6pPr marL="1035101" indent="0">
               <a:buNone/>
-              <a:defRPr sz="756">
+              <a:defRPr sz="724">
                 <a:solidFill>
                   <a:schemeClr val="tx1">
                     <a:tint val="82000"/>
@@ -7050,9 +7361,9 @@
                 </a:solidFill>
               </a:defRPr>
             </a:lvl6pPr>
-            <a:lvl7pPr marL="1295888" indent="0">
+            <a:lvl7pPr marL="1242121" indent="0">
               <a:buNone/>
-              <a:defRPr sz="756">
+              <a:defRPr sz="724">
                 <a:solidFill>
                   <a:schemeClr val="tx1">
                     <a:tint val="82000"/>
@@ -7060,9 +7371,9 @@
                 </a:solidFill>
               </a:defRPr>
             </a:lvl7pPr>
-            <a:lvl8pPr marL="1511869" indent="0">
+            <a:lvl8pPr marL="1449141" indent="0">
               <a:buNone/>
-              <a:defRPr sz="756">
+              <a:defRPr sz="724">
                 <a:solidFill>
                   <a:schemeClr val="tx1">
                     <a:tint val="82000"/>
@@ -7070,9 +7381,9 @@
                 </a:solidFill>
               </a:defRPr>
             </a:lvl8pPr>
-            <a:lvl9pPr marL="1727850" indent="0">
+            <a:lvl9pPr marL="1656161" indent="0">
               <a:buNone/>
-              <a:defRPr sz="756">
+              <a:defRPr sz="724">
                 <a:solidFill>
                   <a:schemeClr val="tx1">
                     <a:tint val="82000"/>
@@ -7107,7 +7418,7 @@
           <a:p>
             <a:fld id="{F0820250-0589-45C6-A87F-3E34BBC48915}" type="datetimeFigureOut">
               <a:rPr lang="en-GB" smtClean="0"/>
-              <a:t>03/07/2025</a:t>
+              <a:t>04/07/2025</a:t>
             </a:fld>
             <a:endParaRPr lang="en-GB"/>
           </a:p>
@@ -7158,7 +7469,7 @@
     </p:spTree>
     <p:extLst>
       <p:ext uri="{BB962C8B-B14F-4D97-AF65-F5344CB8AC3E}">
-        <p14:creationId xmlns:p14="http://schemas.microsoft.com/office/powerpoint/2010/main" val="175238260"/>
+        <p14:creationId xmlns:p14="http://schemas.microsoft.com/office/powerpoint/2010/main" val="2675034064"/>
       </p:ext>
     </p:extLst>
   </p:cSld>
@@ -7220,8 +7531,8 @@
         </p:nvSpPr>
         <p:spPr>
           <a:xfrm>
-            <a:off x="296972" y="982118"/>
-            <a:ext cx="1835825" cy="2340859"/>
+            <a:off x="284639" y="982118"/>
+            <a:ext cx="1759585" cy="2340859"/>
           </a:xfrm>
         </p:spPr>
         <p:txBody>
@@ -7277,8 +7588,8 @@
         </p:nvSpPr>
         <p:spPr>
           <a:xfrm>
-            <a:off x="2186791" y="982118"/>
-            <a:ext cx="1835825" cy="2340859"/>
+            <a:off x="2095976" y="982118"/>
+            <a:ext cx="1759585" cy="2340859"/>
           </a:xfrm>
         </p:spPr>
         <p:txBody>
@@ -7339,7 +7650,7 @@
           <a:p>
             <a:fld id="{F0820250-0589-45C6-A87F-3E34BBC48915}" type="datetimeFigureOut">
               <a:rPr lang="en-GB" smtClean="0"/>
-              <a:t>03/07/2025</a:t>
+              <a:t>04/07/2025</a:t>
             </a:fld>
             <a:endParaRPr lang="en-GB"/>
           </a:p>
@@ -7390,7 +7701,7 @@
     </p:spTree>
     <p:extLst>
       <p:ext uri="{BB962C8B-B14F-4D97-AF65-F5344CB8AC3E}">
-        <p14:creationId xmlns:p14="http://schemas.microsoft.com/office/powerpoint/2010/main" val="3856796261"/>
+        <p14:creationId xmlns:p14="http://schemas.microsoft.com/office/powerpoint/2010/main" val="1613741966"/>
       </p:ext>
     </p:extLst>
   </p:cSld>
@@ -7429,8 +7740,8 @@
         </p:nvSpPr>
         <p:spPr>
           <a:xfrm>
-            <a:off x="297534" y="196424"/>
-            <a:ext cx="3725645" cy="713104"/>
+            <a:off x="285178" y="196424"/>
+            <a:ext cx="3570923" cy="713104"/>
           </a:xfrm>
         </p:spPr>
         <p:txBody>
@@ -7457,8 +7768,8 @@
         </p:nvSpPr>
         <p:spPr>
           <a:xfrm>
-            <a:off x="297535" y="904403"/>
-            <a:ext cx="1827388" cy="443234"/>
+            <a:off x="285179" y="904403"/>
+            <a:ext cx="1751498" cy="443234"/>
           </a:xfrm>
         </p:spPr>
         <p:txBody>
@@ -7466,39 +7777,39 @@
           <a:lstStyle>
             <a:lvl1pPr marL="0" indent="0">
               <a:buNone/>
-              <a:defRPr sz="1134" b="1"/>
+              <a:defRPr sz="1087" b="1"/>
             </a:lvl1pPr>
-            <a:lvl2pPr marL="215981" indent="0">
+            <a:lvl2pPr marL="207020" indent="0">
               <a:buNone/>
-              <a:defRPr sz="945" b="1"/>
+              <a:defRPr sz="906" b="1"/>
             </a:lvl2pPr>
-            <a:lvl3pPr marL="431963" indent="0">
+            <a:lvl3pPr marL="414040" indent="0">
               <a:buNone/>
-              <a:defRPr sz="850" b="1"/>
+              <a:defRPr sz="815" b="1"/>
             </a:lvl3pPr>
-            <a:lvl4pPr marL="647944" indent="0">
+            <a:lvl4pPr marL="621060" indent="0">
               <a:buNone/>
-              <a:defRPr sz="756" b="1"/>
+              <a:defRPr sz="724" b="1"/>
             </a:lvl4pPr>
-            <a:lvl5pPr marL="863925" indent="0">
+            <a:lvl5pPr marL="828081" indent="0">
               <a:buNone/>
-              <a:defRPr sz="756" b="1"/>
+              <a:defRPr sz="724" b="1"/>
             </a:lvl5pPr>
-            <a:lvl6pPr marL="1079906" indent="0">
+            <a:lvl6pPr marL="1035101" indent="0">
               <a:buNone/>
-              <a:defRPr sz="756" b="1"/>
+              <a:defRPr sz="724" b="1"/>
             </a:lvl6pPr>
-            <a:lvl7pPr marL="1295888" indent="0">
+            <a:lvl7pPr marL="1242121" indent="0">
               <a:buNone/>
-              <a:defRPr sz="756" b="1"/>
+              <a:defRPr sz="724" b="1"/>
             </a:lvl7pPr>
-            <a:lvl8pPr marL="1511869" indent="0">
+            <a:lvl8pPr marL="1449141" indent="0">
               <a:buNone/>
-              <a:defRPr sz="756" b="1"/>
+              <a:defRPr sz="724" b="1"/>
             </a:lvl8pPr>
-            <a:lvl9pPr marL="1727850" indent="0">
+            <a:lvl9pPr marL="1656161" indent="0">
               <a:buNone/>
-              <a:defRPr sz="756" b="1"/>
+              <a:defRPr sz="724" b="1"/>
             </a:lvl9pPr>
           </a:lstStyle>
           <a:p>
@@ -7522,8 +7833,8 @@
         </p:nvSpPr>
         <p:spPr>
           <a:xfrm>
-            <a:off x="297535" y="1347638"/>
-            <a:ext cx="1827388" cy="1982172"/>
+            <a:off x="285179" y="1347638"/>
+            <a:ext cx="1751498" cy="1982172"/>
           </a:xfrm>
         </p:spPr>
         <p:txBody>
@@ -7579,8 +7890,8 @@
         </p:nvSpPr>
         <p:spPr>
           <a:xfrm>
-            <a:off x="2186791" y="904403"/>
-            <a:ext cx="1836388" cy="443234"/>
+            <a:off x="2095977" y="904403"/>
+            <a:ext cx="1760124" cy="443234"/>
           </a:xfrm>
         </p:spPr>
         <p:txBody>
@@ -7588,39 +7899,39 @@
           <a:lstStyle>
             <a:lvl1pPr marL="0" indent="0">
               <a:buNone/>
-              <a:defRPr sz="1134" b="1"/>
+              <a:defRPr sz="1087" b="1"/>
             </a:lvl1pPr>
-            <a:lvl2pPr marL="215981" indent="0">
+            <a:lvl2pPr marL="207020" indent="0">
               <a:buNone/>
-              <a:defRPr sz="945" b="1"/>
+              <a:defRPr sz="906" b="1"/>
             </a:lvl2pPr>
-            <a:lvl3pPr marL="431963" indent="0">
+            <a:lvl3pPr marL="414040" indent="0">
               <a:buNone/>
-              <a:defRPr sz="850" b="1"/>
+              <a:defRPr sz="815" b="1"/>
             </a:lvl3pPr>
-            <a:lvl4pPr marL="647944" indent="0">
+            <a:lvl4pPr marL="621060" indent="0">
               <a:buNone/>
-              <a:defRPr sz="756" b="1"/>
+              <a:defRPr sz="724" b="1"/>
             </a:lvl4pPr>
-            <a:lvl5pPr marL="863925" indent="0">
+            <a:lvl5pPr marL="828081" indent="0">
               <a:buNone/>
-              <a:defRPr sz="756" b="1"/>
+              <a:defRPr sz="724" b="1"/>
             </a:lvl5pPr>
-            <a:lvl6pPr marL="1079906" indent="0">
+            <a:lvl6pPr marL="1035101" indent="0">
               <a:buNone/>
-              <a:defRPr sz="756" b="1"/>
+              <a:defRPr sz="724" b="1"/>
             </a:lvl6pPr>
-            <a:lvl7pPr marL="1295888" indent="0">
+            <a:lvl7pPr marL="1242121" indent="0">
               <a:buNone/>
-              <a:defRPr sz="756" b="1"/>
+              <a:defRPr sz="724" b="1"/>
             </a:lvl7pPr>
-            <a:lvl8pPr marL="1511869" indent="0">
+            <a:lvl8pPr marL="1449141" indent="0">
               <a:buNone/>
-              <a:defRPr sz="756" b="1"/>
+              <a:defRPr sz="724" b="1"/>
             </a:lvl8pPr>
-            <a:lvl9pPr marL="1727850" indent="0">
+            <a:lvl9pPr marL="1656161" indent="0">
               <a:buNone/>
-              <a:defRPr sz="756" b="1"/>
+              <a:defRPr sz="724" b="1"/>
             </a:lvl9pPr>
           </a:lstStyle>
           <a:p>
@@ -7644,8 +7955,8 @@
         </p:nvSpPr>
         <p:spPr>
           <a:xfrm>
-            <a:off x="2186791" y="1347638"/>
-            <a:ext cx="1836388" cy="1982172"/>
+            <a:off x="2095977" y="1347638"/>
+            <a:ext cx="1760124" cy="1982172"/>
           </a:xfrm>
         </p:spPr>
         <p:txBody>
@@ -7706,7 +8017,7 @@
           <a:p>
             <a:fld id="{F0820250-0589-45C6-A87F-3E34BBC48915}" type="datetimeFigureOut">
               <a:rPr lang="en-GB" smtClean="0"/>
-              <a:t>03/07/2025</a:t>
+              <a:t>04/07/2025</a:t>
             </a:fld>
             <a:endParaRPr lang="en-GB"/>
           </a:p>
@@ -7757,7 +8068,7 @@
     </p:spTree>
     <p:extLst>
       <p:ext uri="{BB962C8B-B14F-4D97-AF65-F5344CB8AC3E}">
-        <p14:creationId xmlns:p14="http://schemas.microsoft.com/office/powerpoint/2010/main" val="2524364878"/>
+        <p14:creationId xmlns:p14="http://schemas.microsoft.com/office/powerpoint/2010/main" val="229637189"/>
       </p:ext>
     </p:extLst>
   </p:cSld>
@@ -7824,7 +8135,7 @@
           <a:p>
             <a:fld id="{F0820250-0589-45C6-A87F-3E34BBC48915}" type="datetimeFigureOut">
               <a:rPr lang="en-GB" smtClean="0"/>
-              <a:t>03/07/2025</a:t>
+              <a:t>04/07/2025</a:t>
             </a:fld>
             <a:endParaRPr lang="en-GB"/>
           </a:p>
@@ -7875,7 +8186,7 @@
     </p:spTree>
     <p:extLst>
       <p:ext uri="{BB962C8B-B14F-4D97-AF65-F5344CB8AC3E}">
-        <p14:creationId xmlns:p14="http://schemas.microsoft.com/office/powerpoint/2010/main" val="3562786472"/>
+        <p14:creationId xmlns:p14="http://schemas.microsoft.com/office/powerpoint/2010/main" val="4209848626"/>
       </p:ext>
     </p:extLst>
   </p:cSld>
@@ -7919,7 +8230,7 @@
           <a:p>
             <a:fld id="{F0820250-0589-45C6-A87F-3E34BBC48915}" type="datetimeFigureOut">
               <a:rPr lang="en-GB" smtClean="0"/>
-              <a:t>03/07/2025</a:t>
+              <a:t>04/07/2025</a:t>
             </a:fld>
             <a:endParaRPr lang="en-GB"/>
           </a:p>
@@ -7970,7 +8281,7 @@
     </p:spTree>
     <p:extLst>
       <p:ext uri="{BB962C8B-B14F-4D97-AF65-F5344CB8AC3E}">
-        <p14:creationId xmlns:p14="http://schemas.microsoft.com/office/powerpoint/2010/main" val="2669031148"/>
+        <p14:creationId xmlns:p14="http://schemas.microsoft.com/office/powerpoint/2010/main" val="2678539145"/>
       </p:ext>
     </p:extLst>
   </p:cSld>
@@ -8009,15 +8320,15 @@
         </p:nvSpPr>
         <p:spPr>
           <a:xfrm>
-            <a:off x="297534" y="245957"/>
-            <a:ext cx="1393180" cy="860848"/>
+            <a:off x="285178" y="245957"/>
+            <a:ext cx="1335322" cy="860848"/>
           </a:xfrm>
         </p:spPr>
         <p:txBody>
           <a:bodyPr anchor="b"/>
           <a:lstStyle>
             <a:lvl1pPr>
-              <a:defRPr sz="1512"/>
+              <a:defRPr sz="1449"/>
             </a:lvl1pPr>
           </a:lstStyle>
           <a:p>
@@ -8041,39 +8352,39 @@
         </p:nvSpPr>
         <p:spPr>
           <a:xfrm>
-            <a:off x="1836388" y="531199"/>
-            <a:ext cx="2186791" cy="2621830"/>
+            <a:off x="1760124" y="531199"/>
+            <a:ext cx="2095976" cy="2621830"/>
           </a:xfrm>
         </p:spPr>
         <p:txBody>
           <a:bodyPr/>
           <a:lstStyle>
             <a:lvl1pPr>
-              <a:defRPr sz="1512"/>
+              <a:defRPr sz="1449"/>
             </a:lvl1pPr>
             <a:lvl2pPr>
-              <a:defRPr sz="1323"/>
+              <a:defRPr sz="1268"/>
             </a:lvl2pPr>
             <a:lvl3pPr>
-              <a:defRPr sz="1134"/>
+              <a:defRPr sz="1087"/>
             </a:lvl3pPr>
             <a:lvl4pPr>
-              <a:defRPr sz="945"/>
+              <a:defRPr sz="906"/>
             </a:lvl4pPr>
             <a:lvl5pPr>
-              <a:defRPr sz="945"/>
+              <a:defRPr sz="906"/>
             </a:lvl5pPr>
             <a:lvl6pPr>
-              <a:defRPr sz="945"/>
+              <a:defRPr sz="906"/>
             </a:lvl6pPr>
             <a:lvl7pPr>
-              <a:defRPr sz="945"/>
+              <a:defRPr sz="906"/>
             </a:lvl7pPr>
             <a:lvl8pPr>
-              <a:defRPr sz="945"/>
+              <a:defRPr sz="906"/>
             </a:lvl8pPr>
             <a:lvl9pPr>
-              <a:defRPr sz="945"/>
+              <a:defRPr sz="906"/>
             </a:lvl9pPr>
           </a:lstStyle>
           <a:p>
@@ -8126,8 +8437,8 @@
         </p:nvSpPr>
         <p:spPr>
           <a:xfrm>
-            <a:off x="297534" y="1106805"/>
-            <a:ext cx="1393180" cy="2050493"/>
+            <a:off x="285178" y="1106805"/>
+            <a:ext cx="1335322" cy="2050493"/>
           </a:xfrm>
         </p:spPr>
         <p:txBody>
@@ -8135,39 +8446,39 @@
           <a:lstStyle>
             <a:lvl1pPr marL="0" indent="0">
               <a:buNone/>
-              <a:defRPr sz="756"/>
+              <a:defRPr sz="724"/>
             </a:lvl1pPr>
-            <a:lvl2pPr marL="215981" indent="0">
+            <a:lvl2pPr marL="207020" indent="0">
               <a:buNone/>
-              <a:defRPr sz="661"/>
+              <a:defRPr sz="634"/>
             </a:lvl2pPr>
-            <a:lvl3pPr marL="431963" indent="0">
+            <a:lvl3pPr marL="414040" indent="0">
               <a:buNone/>
-              <a:defRPr sz="567"/>
+              <a:defRPr sz="543"/>
             </a:lvl3pPr>
-            <a:lvl4pPr marL="647944" indent="0">
+            <a:lvl4pPr marL="621060" indent="0">
               <a:buNone/>
-              <a:defRPr sz="472"/>
+              <a:defRPr sz="453"/>
             </a:lvl4pPr>
-            <a:lvl5pPr marL="863925" indent="0">
+            <a:lvl5pPr marL="828081" indent="0">
               <a:buNone/>
-              <a:defRPr sz="472"/>
+              <a:defRPr sz="453"/>
             </a:lvl5pPr>
-            <a:lvl6pPr marL="1079906" indent="0">
+            <a:lvl6pPr marL="1035101" indent="0">
               <a:buNone/>
-              <a:defRPr sz="472"/>
+              <a:defRPr sz="453"/>
             </a:lvl6pPr>
-            <a:lvl7pPr marL="1295888" indent="0">
+            <a:lvl7pPr marL="1242121" indent="0">
               <a:buNone/>
-              <a:defRPr sz="472"/>
+              <a:defRPr sz="453"/>
             </a:lvl7pPr>
-            <a:lvl8pPr marL="1511869" indent="0">
+            <a:lvl8pPr marL="1449141" indent="0">
               <a:buNone/>
-              <a:defRPr sz="472"/>
+              <a:defRPr sz="453"/>
             </a:lvl8pPr>
-            <a:lvl9pPr marL="1727850" indent="0">
+            <a:lvl9pPr marL="1656161" indent="0">
               <a:buNone/>
-              <a:defRPr sz="472"/>
+              <a:defRPr sz="453"/>
             </a:lvl9pPr>
           </a:lstStyle>
           <a:p>
@@ -8196,7 +8507,7 @@
           <a:p>
             <a:fld id="{F0820250-0589-45C6-A87F-3E34BBC48915}" type="datetimeFigureOut">
               <a:rPr lang="en-GB" smtClean="0"/>
-              <a:t>03/07/2025</a:t>
+              <a:t>04/07/2025</a:t>
             </a:fld>
             <a:endParaRPr lang="en-GB"/>
           </a:p>
@@ -8247,7 +8558,7 @@
     </p:spTree>
     <p:extLst>
       <p:ext uri="{BB962C8B-B14F-4D97-AF65-F5344CB8AC3E}">
-        <p14:creationId xmlns:p14="http://schemas.microsoft.com/office/powerpoint/2010/main" val="3502670324"/>
+        <p14:creationId xmlns:p14="http://schemas.microsoft.com/office/powerpoint/2010/main" val="835353860"/>
       </p:ext>
     </p:extLst>
   </p:cSld>
@@ -8286,15 +8597,15 @@
         </p:nvSpPr>
         <p:spPr>
           <a:xfrm>
-            <a:off x="297534" y="245957"/>
-            <a:ext cx="1393180" cy="860848"/>
+            <a:off x="285178" y="245957"/>
+            <a:ext cx="1335322" cy="860848"/>
           </a:xfrm>
         </p:spPr>
         <p:txBody>
           <a:bodyPr anchor="b"/>
           <a:lstStyle>
             <a:lvl1pPr>
-              <a:defRPr sz="1512"/>
+              <a:defRPr sz="1449"/>
             </a:lvl1pPr>
           </a:lstStyle>
           <a:p>
@@ -8318,8 +8629,8 @@
         </p:nvSpPr>
         <p:spPr>
           <a:xfrm>
-            <a:off x="1836388" y="531199"/>
-            <a:ext cx="2186791" cy="2621830"/>
+            <a:off x="1760124" y="531199"/>
+            <a:ext cx="2095976" cy="2621830"/>
           </a:xfrm>
         </p:spPr>
         <p:txBody>
@@ -8327,39 +8638,39 @@
           <a:lstStyle>
             <a:lvl1pPr marL="0" indent="0">
               <a:buNone/>
-              <a:defRPr sz="1512"/>
+              <a:defRPr sz="1449"/>
             </a:lvl1pPr>
-            <a:lvl2pPr marL="215981" indent="0">
+            <a:lvl2pPr marL="207020" indent="0">
               <a:buNone/>
-              <a:defRPr sz="1323"/>
+              <a:defRPr sz="1268"/>
             </a:lvl2pPr>
-            <a:lvl3pPr marL="431963" indent="0">
+            <a:lvl3pPr marL="414040" indent="0">
               <a:buNone/>
-              <a:defRPr sz="1134"/>
+              <a:defRPr sz="1087"/>
             </a:lvl3pPr>
-            <a:lvl4pPr marL="647944" indent="0">
+            <a:lvl4pPr marL="621060" indent="0">
               <a:buNone/>
-              <a:defRPr sz="945"/>
+              <a:defRPr sz="906"/>
             </a:lvl4pPr>
-            <a:lvl5pPr marL="863925" indent="0">
+            <a:lvl5pPr marL="828081" indent="0">
               <a:buNone/>
-              <a:defRPr sz="945"/>
+              <a:defRPr sz="906"/>
             </a:lvl5pPr>
-            <a:lvl6pPr marL="1079906" indent="0">
+            <a:lvl6pPr marL="1035101" indent="0">
               <a:buNone/>
-              <a:defRPr sz="945"/>
+              <a:defRPr sz="906"/>
             </a:lvl6pPr>
-            <a:lvl7pPr marL="1295888" indent="0">
+            <a:lvl7pPr marL="1242121" indent="0">
               <a:buNone/>
-              <a:defRPr sz="945"/>
+              <a:defRPr sz="906"/>
             </a:lvl7pPr>
-            <a:lvl8pPr marL="1511869" indent="0">
+            <a:lvl8pPr marL="1449141" indent="0">
               <a:buNone/>
-              <a:defRPr sz="945"/>
+              <a:defRPr sz="906"/>
             </a:lvl8pPr>
-            <a:lvl9pPr marL="1727850" indent="0">
+            <a:lvl9pPr marL="1656161" indent="0">
               <a:buNone/>
-              <a:defRPr sz="945"/>
+              <a:defRPr sz="906"/>
             </a:lvl9pPr>
           </a:lstStyle>
           <a:p>
@@ -8383,8 +8694,8 @@
         </p:nvSpPr>
         <p:spPr>
           <a:xfrm>
-            <a:off x="297534" y="1106805"/>
-            <a:ext cx="1393180" cy="2050493"/>
+            <a:off x="285178" y="1106805"/>
+            <a:ext cx="1335322" cy="2050493"/>
           </a:xfrm>
         </p:spPr>
         <p:txBody>
@@ -8392,39 +8703,39 @@
           <a:lstStyle>
             <a:lvl1pPr marL="0" indent="0">
               <a:buNone/>
-              <a:defRPr sz="756"/>
+              <a:defRPr sz="724"/>
             </a:lvl1pPr>
-            <a:lvl2pPr marL="215981" indent="0">
+            <a:lvl2pPr marL="207020" indent="0">
               <a:buNone/>
-              <a:defRPr sz="661"/>
+              <a:defRPr sz="634"/>
             </a:lvl2pPr>
-            <a:lvl3pPr marL="431963" indent="0">
+            <a:lvl3pPr marL="414040" indent="0">
               <a:buNone/>
-              <a:defRPr sz="567"/>
+              <a:defRPr sz="543"/>
             </a:lvl3pPr>
-            <a:lvl4pPr marL="647944" indent="0">
+            <a:lvl4pPr marL="621060" indent="0">
               <a:buNone/>
-              <a:defRPr sz="472"/>
+              <a:defRPr sz="453"/>
             </a:lvl4pPr>
-            <a:lvl5pPr marL="863925" indent="0">
+            <a:lvl5pPr marL="828081" indent="0">
               <a:buNone/>
-              <a:defRPr sz="472"/>
+              <a:defRPr sz="453"/>
             </a:lvl5pPr>
-            <a:lvl6pPr marL="1079906" indent="0">
+            <a:lvl6pPr marL="1035101" indent="0">
               <a:buNone/>
-              <a:defRPr sz="472"/>
+              <a:defRPr sz="453"/>
             </a:lvl6pPr>
-            <a:lvl7pPr marL="1295888" indent="0">
+            <a:lvl7pPr marL="1242121" indent="0">
               <a:buNone/>
-              <a:defRPr sz="472"/>
+              <a:defRPr sz="453"/>
             </a:lvl7pPr>
-            <a:lvl8pPr marL="1511869" indent="0">
+            <a:lvl8pPr marL="1449141" indent="0">
               <a:buNone/>
-              <a:defRPr sz="472"/>
+              <a:defRPr sz="453"/>
             </a:lvl8pPr>
-            <a:lvl9pPr marL="1727850" indent="0">
+            <a:lvl9pPr marL="1656161" indent="0">
               <a:buNone/>
-              <a:defRPr sz="472"/>
+              <a:defRPr sz="453"/>
             </a:lvl9pPr>
           </a:lstStyle>
           <a:p>
@@ -8453,7 +8764,7 @@
           <a:p>
             <a:fld id="{F0820250-0589-45C6-A87F-3E34BBC48915}" type="datetimeFigureOut">
               <a:rPr lang="en-GB" smtClean="0"/>
-              <a:t>03/07/2025</a:t>
+              <a:t>04/07/2025</a:t>
             </a:fld>
             <a:endParaRPr lang="en-GB"/>
           </a:p>
@@ -8504,7 +8815,7 @@
     </p:spTree>
     <p:extLst>
       <p:ext uri="{BB962C8B-B14F-4D97-AF65-F5344CB8AC3E}">
-        <p14:creationId xmlns:p14="http://schemas.microsoft.com/office/powerpoint/2010/main" val="2146896759"/>
+        <p14:creationId xmlns:p14="http://schemas.microsoft.com/office/powerpoint/2010/main" val="732577237"/>
       </p:ext>
     </p:extLst>
   </p:cSld>
@@ -8548,8 +8859,8 @@
         </p:nvSpPr>
         <p:spPr>
           <a:xfrm>
-            <a:off x="296972" y="196424"/>
-            <a:ext cx="3725645" cy="713104"/>
+            <a:off x="284639" y="196424"/>
+            <a:ext cx="3570923" cy="713104"/>
           </a:xfrm>
           <a:prstGeom prst="rect">
             <a:avLst/>
@@ -8581,8 +8892,8 @@
         </p:nvSpPr>
         <p:spPr>
           <a:xfrm>
-            <a:off x="296972" y="982118"/>
-            <a:ext cx="3725645" cy="2340859"/>
+            <a:off x="284639" y="982118"/>
+            <a:ext cx="3570923" cy="2340859"/>
           </a:xfrm>
           <a:prstGeom prst="rect">
             <a:avLst/>
@@ -8643,8 +8954,8 @@
         </p:nvSpPr>
         <p:spPr>
           <a:xfrm>
-            <a:off x="296972" y="3419482"/>
-            <a:ext cx="971907" cy="196424"/>
+            <a:off x="284639" y="3419482"/>
+            <a:ext cx="931545" cy="196424"/>
           </a:xfrm>
           <a:prstGeom prst="rect">
             <a:avLst/>
@@ -8654,7 +8965,7 @@
           <a:bodyPr vert="horz" lIns="91440" tIns="45720" rIns="91440" bIns="45720" rtlCol="0" anchor="ctr"/>
           <a:lstStyle>
             <a:lvl1pPr algn="l">
-              <a:defRPr sz="567">
+              <a:defRPr sz="543">
                 <a:solidFill>
                   <a:schemeClr val="tx1">
                     <a:tint val="82000"/>
@@ -8666,7 +8977,7 @@
           <a:p>
             <a:fld id="{F0820250-0589-45C6-A87F-3E34BBC48915}" type="datetimeFigureOut">
               <a:rPr lang="en-GB" smtClean="0"/>
-              <a:t>03/07/2025</a:t>
+              <a:t>04/07/2025</a:t>
             </a:fld>
             <a:endParaRPr lang="en-GB"/>
           </a:p>
@@ -8684,8 +8995,8 @@
         </p:nvSpPr>
         <p:spPr>
           <a:xfrm>
-            <a:off x="1430864" y="3419482"/>
-            <a:ext cx="1457861" cy="196424"/>
+            <a:off x="1371441" y="3419482"/>
+            <a:ext cx="1397318" cy="196424"/>
           </a:xfrm>
           <a:prstGeom prst="rect">
             <a:avLst/>
@@ -8695,7 +9006,7 @@
           <a:bodyPr vert="horz" lIns="91440" tIns="45720" rIns="91440" bIns="45720" rtlCol="0" anchor="ctr"/>
           <a:lstStyle>
             <a:lvl1pPr algn="ctr">
-              <a:defRPr sz="567">
+              <a:defRPr sz="543">
                 <a:solidFill>
                   <a:schemeClr val="tx1">
                     <a:tint val="82000"/>
@@ -8721,8 +9032,8 @@
         </p:nvSpPr>
         <p:spPr>
           <a:xfrm>
-            <a:off x="3050709" y="3419482"/>
-            <a:ext cx="971907" cy="196424"/>
+            <a:off x="2924016" y="3419482"/>
+            <a:ext cx="931545" cy="196424"/>
           </a:xfrm>
           <a:prstGeom prst="rect">
             <a:avLst/>
@@ -8732,7 +9043,7 @@
           <a:bodyPr vert="horz" lIns="91440" tIns="45720" rIns="91440" bIns="45720" rtlCol="0" anchor="ctr"/>
           <a:lstStyle>
             <a:lvl1pPr algn="r">
-              <a:defRPr sz="567">
+              <a:defRPr sz="543">
                 <a:solidFill>
                   <a:schemeClr val="tx1">
                     <a:tint val="82000"/>
@@ -8753,27 +9064,27 @@
     </p:spTree>
     <p:extLst>
       <p:ext uri="{BB962C8B-B14F-4D97-AF65-F5344CB8AC3E}">
-        <p14:creationId xmlns:p14="http://schemas.microsoft.com/office/powerpoint/2010/main" val="455481283"/>
+        <p14:creationId xmlns:p14="http://schemas.microsoft.com/office/powerpoint/2010/main" val="3744025424"/>
       </p:ext>
     </p:extLst>
   </p:cSld>
   <p:clrMap bg1="lt1" tx1="dk1" bg2="lt2" tx2="dk2" accent1="accent1" accent2="accent2" accent3="accent3" accent4="accent4" accent5="accent5" accent6="accent6" hlink="hlink" folHlink="folHlink"/>
   <p:sldLayoutIdLst>
-    <p:sldLayoutId id="2147483721" r:id="rId1"/>
-    <p:sldLayoutId id="2147483722" r:id="rId2"/>
-    <p:sldLayoutId id="2147483723" r:id="rId3"/>
-    <p:sldLayoutId id="2147483724" r:id="rId4"/>
-    <p:sldLayoutId id="2147483725" r:id="rId5"/>
-    <p:sldLayoutId id="2147483726" r:id="rId6"/>
-    <p:sldLayoutId id="2147483727" r:id="rId7"/>
-    <p:sldLayoutId id="2147483728" r:id="rId8"/>
-    <p:sldLayoutId id="2147483729" r:id="rId9"/>
-    <p:sldLayoutId id="2147483730" r:id="rId10"/>
-    <p:sldLayoutId id="2147483731" r:id="rId11"/>
+    <p:sldLayoutId id="2147483733" r:id="rId1"/>
+    <p:sldLayoutId id="2147483734" r:id="rId2"/>
+    <p:sldLayoutId id="2147483735" r:id="rId3"/>
+    <p:sldLayoutId id="2147483736" r:id="rId4"/>
+    <p:sldLayoutId id="2147483737" r:id="rId5"/>
+    <p:sldLayoutId id="2147483738" r:id="rId6"/>
+    <p:sldLayoutId id="2147483739" r:id="rId7"/>
+    <p:sldLayoutId id="2147483740" r:id="rId8"/>
+    <p:sldLayoutId id="2147483741" r:id="rId9"/>
+    <p:sldLayoutId id="2147483742" r:id="rId10"/>
+    <p:sldLayoutId id="2147483743" r:id="rId11"/>
   </p:sldLayoutIdLst>
   <p:txStyles>
     <p:titleStyle>
-      <a:lvl1pPr algn="l" defTabSz="431963" rtl="0" eaLnBrk="1" latinLnBrk="0" hangingPunct="1">
+      <a:lvl1pPr algn="l" defTabSz="414040" rtl="0" eaLnBrk="1" latinLnBrk="0" hangingPunct="1">
         <a:lnSpc>
           <a:spcPct val="90000"/>
         </a:lnSpc>
@@ -8781,7 +9092,7 @@
           <a:spcPct val="0"/>
         </a:spcBef>
         <a:buNone/>
-        <a:defRPr sz="2079" kern="1200">
+        <a:defRPr sz="1992" kern="1200">
           <a:solidFill>
             <a:schemeClr val="tx1"/>
           </a:solidFill>
@@ -8792,16 +9103,16 @@
       </a:lvl1pPr>
     </p:titleStyle>
     <p:bodyStyle>
-      <a:lvl1pPr marL="107991" indent="-107991" algn="l" defTabSz="431963" rtl="0" eaLnBrk="1" latinLnBrk="0" hangingPunct="1">
+      <a:lvl1pPr marL="103510" indent="-103510" algn="l" defTabSz="414040" rtl="0" eaLnBrk="1" latinLnBrk="0" hangingPunct="1">
         <a:lnSpc>
           <a:spcPct val="90000"/>
         </a:lnSpc>
         <a:spcBef>
-          <a:spcPts val="472"/>
+          <a:spcPts val="453"/>
         </a:spcBef>
         <a:buFont typeface="Arial" panose="020B0604020202020204" pitchFamily="34" charset="0"/>
         <a:buChar char="•"/>
-        <a:defRPr sz="1323" kern="1200">
+        <a:defRPr sz="1268" kern="1200">
           <a:solidFill>
             <a:schemeClr val="tx1"/>
           </a:solidFill>
@@ -8810,16 +9121,16 @@
           <a:cs typeface="+mn-cs"/>
         </a:defRPr>
       </a:lvl1pPr>
-      <a:lvl2pPr marL="323972" indent="-107991" algn="l" defTabSz="431963" rtl="0" eaLnBrk="1" latinLnBrk="0" hangingPunct="1">
+      <a:lvl2pPr marL="310530" indent="-103510" algn="l" defTabSz="414040" rtl="0" eaLnBrk="1" latinLnBrk="0" hangingPunct="1">
         <a:lnSpc>
           <a:spcPct val="90000"/>
         </a:lnSpc>
         <a:spcBef>
-          <a:spcPts val="236"/>
+          <a:spcPts val="226"/>
         </a:spcBef>
         <a:buFont typeface="Arial" panose="020B0604020202020204" pitchFamily="34" charset="0"/>
         <a:buChar char="•"/>
-        <a:defRPr sz="1134" kern="1200">
+        <a:defRPr sz="1087" kern="1200">
           <a:solidFill>
             <a:schemeClr val="tx1"/>
           </a:solidFill>
@@ -8828,16 +9139,16 @@
           <a:cs typeface="+mn-cs"/>
         </a:defRPr>
       </a:lvl2pPr>
-      <a:lvl3pPr marL="539953" indent="-107991" algn="l" defTabSz="431963" rtl="0" eaLnBrk="1" latinLnBrk="0" hangingPunct="1">
+      <a:lvl3pPr marL="517550" indent="-103510" algn="l" defTabSz="414040" rtl="0" eaLnBrk="1" latinLnBrk="0" hangingPunct="1">
         <a:lnSpc>
           <a:spcPct val="90000"/>
         </a:lnSpc>
         <a:spcBef>
-          <a:spcPts val="236"/>
+          <a:spcPts val="226"/>
         </a:spcBef>
         <a:buFont typeface="Arial" panose="020B0604020202020204" pitchFamily="34" charset="0"/>
         <a:buChar char="•"/>
-        <a:defRPr sz="945" kern="1200">
+        <a:defRPr sz="906" kern="1200">
           <a:solidFill>
             <a:schemeClr val="tx1"/>
           </a:solidFill>
@@ -8846,16 +9157,16 @@
           <a:cs typeface="+mn-cs"/>
         </a:defRPr>
       </a:lvl3pPr>
-      <a:lvl4pPr marL="755934" indent="-107991" algn="l" defTabSz="431963" rtl="0" eaLnBrk="1" latinLnBrk="0" hangingPunct="1">
+      <a:lvl4pPr marL="724571" indent="-103510" algn="l" defTabSz="414040" rtl="0" eaLnBrk="1" latinLnBrk="0" hangingPunct="1">
         <a:lnSpc>
           <a:spcPct val="90000"/>
         </a:lnSpc>
         <a:spcBef>
-          <a:spcPts val="236"/>
+          <a:spcPts val="226"/>
         </a:spcBef>
         <a:buFont typeface="Arial" panose="020B0604020202020204" pitchFamily="34" charset="0"/>
         <a:buChar char="•"/>
-        <a:defRPr sz="850" kern="1200">
+        <a:defRPr sz="815" kern="1200">
           <a:solidFill>
             <a:schemeClr val="tx1"/>
           </a:solidFill>
@@ -8864,16 +9175,16 @@
           <a:cs typeface="+mn-cs"/>
         </a:defRPr>
       </a:lvl4pPr>
-      <a:lvl5pPr marL="971916" indent="-107991" algn="l" defTabSz="431963" rtl="0" eaLnBrk="1" latinLnBrk="0" hangingPunct="1">
+      <a:lvl5pPr marL="931591" indent="-103510" algn="l" defTabSz="414040" rtl="0" eaLnBrk="1" latinLnBrk="0" hangingPunct="1">
         <a:lnSpc>
           <a:spcPct val="90000"/>
         </a:lnSpc>
         <a:spcBef>
-          <a:spcPts val="236"/>
+          <a:spcPts val="226"/>
         </a:spcBef>
         <a:buFont typeface="Arial" panose="020B0604020202020204" pitchFamily="34" charset="0"/>
         <a:buChar char="•"/>
-        <a:defRPr sz="850" kern="1200">
+        <a:defRPr sz="815" kern="1200">
           <a:solidFill>
             <a:schemeClr val="tx1"/>
           </a:solidFill>
@@ -8882,16 +9193,16 @@
           <a:cs typeface="+mn-cs"/>
         </a:defRPr>
       </a:lvl5pPr>
-      <a:lvl6pPr marL="1187897" indent="-107991" algn="l" defTabSz="431963" rtl="0" eaLnBrk="1" latinLnBrk="0" hangingPunct="1">
+      <a:lvl6pPr marL="1138611" indent="-103510" algn="l" defTabSz="414040" rtl="0" eaLnBrk="1" latinLnBrk="0" hangingPunct="1">
         <a:lnSpc>
           <a:spcPct val="90000"/>
         </a:lnSpc>
         <a:spcBef>
-          <a:spcPts val="236"/>
+          <a:spcPts val="226"/>
         </a:spcBef>
         <a:buFont typeface="Arial" panose="020B0604020202020204" pitchFamily="34" charset="0"/>
         <a:buChar char="•"/>
-        <a:defRPr sz="850" kern="1200">
+        <a:defRPr sz="815" kern="1200">
           <a:solidFill>
             <a:schemeClr val="tx1"/>
           </a:solidFill>
@@ -8900,16 +9211,16 @@
           <a:cs typeface="+mn-cs"/>
         </a:defRPr>
       </a:lvl6pPr>
-      <a:lvl7pPr marL="1403878" indent="-107991" algn="l" defTabSz="431963" rtl="0" eaLnBrk="1" latinLnBrk="0" hangingPunct="1">
+      <a:lvl7pPr marL="1345631" indent="-103510" algn="l" defTabSz="414040" rtl="0" eaLnBrk="1" latinLnBrk="0" hangingPunct="1">
         <a:lnSpc>
           <a:spcPct val="90000"/>
         </a:lnSpc>
         <a:spcBef>
-          <a:spcPts val="236"/>
+          <a:spcPts val="226"/>
         </a:spcBef>
         <a:buFont typeface="Arial" panose="020B0604020202020204" pitchFamily="34" charset="0"/>
         <a:buChar char="•"/>
-        <a:defRPr sz="850" kern="1200">
+        <a:defRPr sz="815" kern="1200">
           <a:solidFill>
             <a:schemeClr val="tx1"/>
           </a:solidFill>
@@ -8918,16 +9229,16 @@
           <a:cs typeface="+mn-cs"/>
         </a:defRPr>
       </a:lvl7pPr>
-      <a:lvl8pPr marL="1619860" indent="-107991" algn="l" defTabSz="431963" rtl="0" eaLnBrk="1" latinLnBrk="0" hangingPunct="1">
+      <a:lvl8pPr marL="1552651" indent="-103510" algn="l" defTabSz="414040" rtl="0" eaLnBrk="1" latinLnBrk="0" hangingPunct="1">
         <a:lnSpc>
           <a:spcPct val="90000"/>
         </a:lnSpc>
         <a:spcBef>
-          <a:spcPts val="236"/>
+          <a:spcPts val="226"/>
         </a:spcBef>
         <a:buFont typeface="Arial" panose="020B0604020202020204" pitchFamily="34" charset="0"/>
         <a:buChar char="•"/>
-        <a:defRPr sz="850" kern="1200">
+        <a:defRPr sz="815" kern="1200">
           <a:solidFill>
             <a:schemeClr val="tx1"/>
           </a:solidFill>
@@ -8936,16 +9247,16 @@
           <a:cs typeface="+mn-cs"/>
         </a:defRPr>
       </a:lvl8pPr>
-      <a:lvl9pPr marL="1835841" indent="-107991" algn="l" defTabSz="431963" rtl="0" eaLnBrk="1" latinLnBrk="0" hangingPunct="1">
+      <a:lvl9pPr marL="1759671" indent="-103510" algn="l" defTabSz="414040" rtl="0" eaLnBrk="1" latinLnBrk="0" hangingPunct="1">
         <a:lnSpc>
           <a:spcPct val="90000"/>
         </a:lnSpc>
         <a:spcBef>
-          <a:spcPts val="236"/>
+          <a:spcPts val="226"/>
         </a:spcBef>
         <a:buFont typeface="Arial" panose="020B0604020202020204" pitchFamily="34" charset="0"/>
         <a:buChar char="•"/>
-        <a:defRPr sz="850" kern="1200">
+        <a:defRPr sz="815" kern="1200">
           <a:solidFill>
             <a:schemeClr val="tx1"/>
           </a:solidFill>
@@ -8959,8 +9270,8 @@
       <a:defPPr>
         <a:defRPr lang="en-US"/>
       </a:defPPr>
-      <a:lvl1pPr marL="0" algn="l" defTabSz="431963" rtl="0" eaLnBrk="1" latinLnBrk="0" hangingPunct="1">
-        <a:defRPr sz="850" kern="1200">
+      <a:lvl1pPr marL="0" algn="l" defTabSz="414040" rtl="0" eaLnBrk="1" latinLnBrk="0" hangingPunct="1">
+        <a:defRPr sz="815" kern="1200">
           <a:solidFill>
             <a:schemeClr val="tx1"/>
           </a:solidFill>
@@ -8969,8 +9280,8 @@
           <a:cs typeface="+mn-cs"/>
         </a:defRPr>
       </a:lvl1pPr>
-      <a:lvl2pPr marL="215981" algn="l" defTabSz="431963" rtl="0" eaLnBrk="1" latinLnBrk="0" hangingPunct="1">
-        <a:defRPr sz="850" kern="1200">
+      <a:lvl2pPr marL="207020" algn="l" defTabSz="414040" rtl="0" eaLnBrk="1" latinLnBrk="0" hangingPunct="1">
+        <a:defRPr sz="815" kern="1200">
           <a:solidFill>
             <a:schemeClr val="tx1"/>
           </a:solidFill>
@@ -8979,8 +9290,8 @@
           <a:cs typeface="+mn-cs"/>
         </a:defRPr>
       </a:lvl2pPr>
-      <a:lvl3pPr marL="431963" algn="l" defTabSz="431963" rtl="0" eaLnBrk="1" latinLnBrk="0" hangingPunct="1">
-        <a:defRPr sz="850" kern="1200">
+      <a:lvl3pPr marL="414040" algn="l" defTabSz="414040" rtl="0" eaLnBrk="1" latinLnBrk="0" hangingPunct="1">
+        <a:defRPr sz="815" kern="1200">
           <a:solidFill>
             <a:schemeClr val="tx1"/>
           </a:solidFill>
@@ -8989,8 +9300,8 @@
           <a:cs typeface="+mn-cs"/>
         </a:defRPr>
       </a:lvl3pPr>
-      <a:lvl4pPr marL="647944" algn="l" defTabSz="431963" rtl="0" eaLnBrk="1" latinLnBrk="0" hangingPunct="1">
-        <a:defRPr sz="850" kern="1200">
+      <a:lvl4pPr marL="621060" algn="l" defTabSz="414040" rtl="0" eaLnBrk="1" latinLnBrk="0" hangingPunct="1">
+        <a:defRPr sz="815" kern="1200">
           <a:solidFill>
             <a:schemeClr val="tx1"/>
           </a:solidFill>
@@ -8999,8 +9310,8 @@
           <a:cs typeface="+mn-cs"/>
         </a:defRPr>
       </a:lvl4pPr>
-      <a:lvl5pPr marL="863925" algn="l" defTabSz="431963" rtl="0" eaLnBrk="1" latinLnBrk="0" hangingPunct="1">
-        <a:defRPr sz="850" kern="1200">
+      <a:lvl5pPr marL="828081" algn="l" defTabSz="414040" rtl="0" eaLnBrk="1" latinLnBrk="0" hangingPunct="1">
+        <a:defRPr sz="815" kern="1200">
           <a:solidFill>
             <a:schemeClr val="tx1"/>
           </a:solidFill>
@@ -9009,8 +9320,8 @@
           <a:cs typeface="+mn-cs"/>
         </a:defRPr>
       </a:lvl5pPr>
-      <a:lvl6pPr marL="1079906" algn="l" defTabSz="431963" rtl="0" eaLnBrk="1" latinLnBrk="0" hangingPunct="1">
-        <a:defRPr sz="850" kern="1200">
+      <a:lvl6pPr marL="1035101" algn="l" defTabSz="414040" rtl="0" eaLnBrk="1" latinLnBrk="0" hangingPunct="1">
+        <a:defRPr sz="815" kern="1200">
           <a:solidFill>
             <a:schemeClr val="tx1"/>
           </a:solidFill>
@@ -9019,8 +9330,8 @@
           <a:cs typeface="+mn-cs"/>
         </a:defRPr>
       </a:lvl6pPr>
-      <a:lvl7pPr marL="1295888" algn="l" defTabSz="431963" rtl="0" eaLnBrk="1" latinLnBrk="0" hangingPunct="1">
-        <a:defRPr sz="850" kern="1200">
+      <a:lvl7pPr marL="1242121" algn="l" defTabSz="414040" rtl="0" eaLnBrk="1" latinLnBrk="0" hangingPunct="1">
+        <a:defRPr sz="815" kern="1200">
           <a:solidFill>
             <a:schemeClr val="tx1"/>
           </a:solidFill>
@@ -9029,8 +9340,8 @@
           <a:cs typeface="+mn-cs"/>
         </a:defRPr>
       </a:lvl7pPr>
-      <a:lvl8pPr marL="1511869" algn="l" defTabSz="431963" rtl="0" eaLnBrk="1" latinLnBrk="0" hangingPunct="1">
-        <a:defRPr sz="850" kern="1200">
+      <a:lvl8pPr marL="1449141" algn="l" defTabSz="414040" rtl="0" eaLnBrk="1" latinLnBrk="0" hangingPunct="1">
+        <a:defRPr sz="815" kern="1200">
           <a:solidFill>
             <a:schemeClr val="tx1"/>
           </a:solidFill>
@@ -9039,8 +9350,8 @@
           <a:cs typeface="+mn-cs"/>
         </a:defRPr>
       </a:lvl8pPr>
-      <a:lvl9pPr marL="1727850" algn="l" defTabSz="431963" rtl="0" eaLnBrk="1" latinLnBrk="0" hangingPunct="1">
-        <a:defRPr sz="850" kern="1200">
+      <a:lvl9pPr marL="1656161" algn="l" defTabSz="414040" rtl="0" eaLnBrk="1" latinLnBrk="0" hangingPunct="1">
+        <a:defRPr sz="815" kern="1200">
           <a:solidFill>
             <a:schemeClr val="tx1"/>
           </a:solidFill>
@@ -9071,9 +9382,153 @@
           <a:chExt cx="0" cy="0"/>
         </a:xfrm>
       </p:grpSpPr>
+      <p:pic>
+        <p:nvPicPr>
+          <p:cNvPr id="22" name="Picture 21" descr="A graph with red and black bars&#10;&#10;AI-generated content may be incorrect.">
+            <a:extLst>
+              <a:ext uri="{FF2B5EF4-FFF2-40B4-BE49-F238E27FC236}">
+                <a16:creationId xmlns:a16="http://schemas.microsoft.com/office/drawing/2014/main" id="{955EFEE4-DE3F-D960-A050-F06EF1191405}"/>
+              </a:ext>
+            </a:extLst>
+          </p:cNvPr>
+          <p:cNvPicPr>
+            <a:picLocks noChangeAspect="1"/>
+          </p:cNvPicPr>
+          <p:nvPr/>
+        </p:nvPicPr>
+        <p:blipFill>
+          <a:blip r:embed="rId2">
+            <a:extLst>
+              <a:ext uri="{28A0092B-C50C-407E-A947-70E740481C1C}">
+                <a14:useLocalDpi xmlns:a14="http://schemas.microsoft.com/office/drawing/2010/main" val="0"/>
+              </a:ext>
+            </a:extLst>
+          </a:blip>
+          <a:stretch>
+            <a:fillRect/>
+          </a:stretch>
+        </p:blipFill>
+        <p:spPr>
+          <a:xfrm>
+            <a:off x="301240" y="963471"/>
+            <a:ext cx="1800000" cy="1440000"/>
+          </a:xfrm>
+          <a:prstGeom prst="rect">
+            <a:avLst/>
+          </a:prstGeom>
+        </p:spPr>
+      </p:pic>
+      <p:pic>
+        <p:nvPicPr>
+          <p:cNvPr id="23" name="Picture 22" descr="A graph with red and black squares&#10;&#10;AI-generated content may be incorrect.">
+            <a:extLst>
+              <a:ext uri="{FF2B5EF4-FFF2-40B4-BE49-F238E27FC236}">
+                <a16:creationId xmlns:a16="http://schemas.microsoft.com/office/drawing/2014/main" id="{C6801E96-4F3E-9062-AE87-CF26450D04FE}"/>
+              </a:ext>
+            </a:extLst>
+          </p:cNvPr>
+          <p:cNvPicPr>
+            <a:picLocks noChangeAspect="1"/>
+          </p:cNvPicPr>
+          <p:nvPr/>
+        </p:nvPicPr>
+        <p:blipFill>
+          <a:blip r:embed="rId3">
+            <a:extLst>
+              <a:ext uri="{28A0092B-C50C-407E-A947-70E740481C1C}">
+                <a14:useLocalDpi xmlns:a14="http://schemas.microsoft.com/office/drawing/2010/main" val="0"/>
+              </a:ext>
+            </a:extLst>
+          </a:blip>
+          <a:stretch>
+            <a:fillRect/>
+          </a:stretch>
+        </p:blipFill>
+        <p:spPr>
+          <a:xfrm>
+            <a:off x="2295035" y="963471"/>
+            <a:ext cx="1800000" cy="1440000"/>
+          </a:xfrm>
+          <a:prstGeom prst="rect">
+            <a:avLst/>
+          </a:prstGeom>
+        </p:spPr>
+      </p:pic>
+      <p:pic>
+        <p:nvPicPr>
+          <p:cNvPr id="27" name="Picture 26" descr="A graph with red and black text&#10;&#10;AI-generated content may be incorrect.">
+            <a:extLst>
+              <a:ext uri="{FF2B5EF4-FFF2-40B4-BE49-F238E27FC236}">
+                <a16:creationId xmlns:a16="http://schemas.microsoft.com/office/drawing/2014/main" id="{8263E62F-3620-920B-E91F-F4C795DA1614}"/>
+              </a:ext>
+            </a:extLst>
+          </p:cNvPr>
+          <p:cNvPicPr>
+            <a:picLocks noChangeAspect="1"/>
+          </p:cNvPicPr>
+          <p:nvPr/>
+        </p:nvPicPr>
+        <p:blipFill>
+          <a:blip r:embed="rId4">
+            <a:extLst>
+              <a:ext uri="{28A0092B-C50C-407E-A947-70E740481C1C}">
+                <a14:useLocalDpi xmlns:a14="http://schemas.microsoft.com/office/drawing/2010/main" val="0"/>
+              </a:ext>
+            </a:extLst>
+          </a:blip>
+          <a:stretch>
+            <a:fillRect/>
+          </a:stretch>
+        </p:blipFill>
+        <p:spPr>
+          <a:xfrm>
+            <a:off x="301240" y="2245574"/>
+            <a:ext cx="1800000" cy="1440000"/>
+          </a:xfrm>
+          <a:prstGeom prst="rect">
+            <a:avLst/>
+          </a:prstGeom>
+        </p:spPr>
+      </p:pic>
+      <p:pic>
+        <p:nvPicPr>
+          <p:cNvPr id="28" name="Picture 27" descr="A graph with red and black text&#10;&#10;AI-generated content may be incorrect.">
+            <a:extLst>
+              <a:ext uri="{FF2B5EF4-FFF2-40B4-BE49-F238E27FC236}">
+                <a16:creationId xmlns:a16="http://schemas.microsoft.com/office/drawing/2014/main" id="{A5423CC3-A545-27EA-CA29-2FCA2505715D}"/>
+              </a:ext>
+            </a:extLst>
+          </p:cNvPr>
+          <p:cNvPicPr>
+            <a:picLocks noChangeAspect="1"/>
+          </p:cNvPicPr>
+          <p:nvPr/>
+        </p:nvPicPr>
+        <p:blipFill>
+          <a:blip r:embed="rId5">
+            <a:extLst>
+              <a:ext uri="{28A0092B-C50C-407E-A947-70E740481C1C}">
+                <a14:useLocalDpi xmlns:a14="http://schemas.microsoft.com/office/drawing/2010/main" val="0"/>
+              </a:ext>
+            </a:extLst>
+          </a:blip>
+          <a:stretch>
+            <a:fillRect/>
+          </a:stretch>
+        </p:blipFill>
+        <p:spPr>
+          <a:xfrm>
+            <a:off x="2295035" y="2245574"/>
+            <a:ext cx="1800000" cy="1440000"/>
+          </a:xfrm>
+          <a:prstGeom prst="rect">
+            <a:avLst/>
+          </a:prstGeom>
+        </p:spPr>
+      </p:pic>
       <p:sp>
         <p:nvSpPr>
-          <p:cNvPr id="24" name="Rectangle 23">
+          <p:cNvPr id="29" name="Rectangle 28">
             <a:extLst>
               <a:ext uri="{FF2B5EF4-FFF2-40B4-BE49-F238E27FC236}">
                 <a16:creationId xmlns:a16="http://schemas.microsoft.com/office/drawing/2014/main" id="{7CA80247-944D-A79D-DD75-278A2FC157C4}"/>
@@ -9117,7 +9572,7 @@
           <a:lstStyle/>
           <a:p>
             <a:r>
-              <a:rPr lang="en-GB" sz="1333" b="1" dirty="0">
+              <a:rPr lang="en-GB" sz="1200" b="1" dirty="0">
                 <a:solidFill>
                   <a:schemeClr val="tx1">
                     <a:lumMod val="75000"/>
@@ -9127,12 +9582,12 @@
                 <a:latin typeface="Calibri" panose="020F0502020204030204" pitchFamily="34" charset="0"/>
                 <a:cs typeface="Calibri" panose="020F0502020204030204" pitchFamily="34" charset="0"/>
               </a:rPr>
-              <a:t>Optuna hyperparameter importance</a:t>
+              <a:t>Optuna’s hyperparameter tuning – Hyperparameter importance</a:t>
             </a:r>
           </a:p>
           <a:p>
             <a:r>
-              <a:rPr lang="en-GB" sz="1111" dirty="0">
+              <a:rPr lang="en-GB" sz="1000" dirty="0">
                 <a:solidFill>
                   <a:schemeClr val="tx1">
                     <a:lumMod val="75000"/>
@@ -9142,14 +9597,99 @@
                 <a:latin typeface="Calibri Light" panose="020F0302020204030204" pitchFamily="34" charset="0"/>
                 <a:cs typeface="Calibri Light" panose="020F0302020204030204" pitchFamily="34" charset="0"/>
               </a:rPr>
-              <a:t>Feed-Forward Neural Network</a:t>
+              <a:t>Evaluated over the </a:t>
             </a:r>
+            <a:r>
+              <a:rPr lang="en-GB" sz="1000" b="1" dirty="0">
+                <a:solidFill>
+                  <a:srgbClr val="FF0066"/>
+                </a:solidFill>
+                <a:latin typeface="Calibri" panose="020F0502020204030204" pitchFamily="34" charset="0"/>
+                <a:cs typeface="Calibri" panose="020F0502020204030204" pitchFamily="34" charset="0"/>
+              </a:rPr>
+              <a:t>inner training </a:t>
+            </a:r>
+            <a:r>
+              <a:rPr lang="en-GB" sz="1000" dirty="0">
+                <a:solidFill>
+                  <a:schemeClr val="tx1">
+                    <a:lumMod val="75000"/>
+                    <a:lumOff val="25000"/>
+                  </a:schemeClr>
+                </a:solidFill>
+                <a:latin typeface="Calibri Light" panose="020F0302020204030204" pitchFamily="34" charset="0"/>
+                <a:cs typeface="Calibri Light" panose="020F0302020204030204" pitchFamily="34" charset="0"/>
+              </a:rPr>
+              <a:t>datasets </a:t>
+            </a:r>
+            <a:r>
+              <a:rPr lang="en-GB" sz="1000">
+                <a:solidFill>
+                  <a:schemeClr val="tx1">
+                    <a:lumMod val="75000"/>
+                    <a:lumOff val="25000"/>
+                  </a:schemeClr>
+                </a:solidFill>
+                <a:latin typeface="Calibri Light" panose="020F0302020204030204" pitchFamily="34" charset="0"/>
+                <a:cs typeface="Calibri Light" panose="020F0302020204030204" pitchFamily="34" charset="0"/>
+              </a:rPr>
+              <a:t>for </a:t>
+            </a:r>
+            <a:r>
+              <a:rPr lang="en-GB" sz="1000" u="sng">
+                <a:solidFill>
+                  <a:schemeClr val="tx1">
+                    <a:lumMod val="75000"/>
+                    <a:lumOff val="25000"/>
+                  </a:schemeClr>
+                </a:solidFill>
+                <a:latin typeface="Calibri Light" panose="020F0302020204030204" pitchFamily="34" charset="0"/>
+                <a:cs typeface="Calibri Light" panose="020F0302020204030204" pitchFamily="34" charset="0"/>
+              </a:rPr>
+              <a:t>Feed-Forward Neural </a:t>
+            </a:r>
+            <a:r>
+              <a:rPr lang="en-GB" sz="1000" u="sng" dirty="0">
+                <a:solidFill>
+                  <a:schemeClr val="tx1">
+                    <a:lumMod val="75000"/>
+                    <a:lumOff val="25000"/>
+                  </a:schemeClr>
+                </a:solidFill>
+                <a:latin typeface="Calibri Light" panose="020F0302020204030204" pitchFamily="34" charset="0"/>
+                <a:cs typeface="Calibri Light" panose="020F0302020204030204" pitchFamily="34" charset="0"/>
+              </a:rPr>
+              <a:t>N</a:t>
+            </a:r>
+            <a:r>
+              <a:rPr lang="en-GB" sz="1000" u="sng">
+                <a:solidFill>
+                  <a:schemeClr val="tx1">
+                    <a:lumMod val="75000"/>
+                    <a:lumOff val="25000"/>
+                  </a:schemeClr>
+                </a:solidFill>
+                <a:latin typeface="Calibri Light" panose="020F0302020204030204" pitchFamily="34" charset="0"/>
+                <a:cs typeface="Calibri Light" panose="020F0302020204030204" pitchFamily="34" charset="0"/>
+              </a:rPr>
+              <a:t>etwork </a:t>
+            </a:r>
+            <a:endParaRPr lang="en-GB" sz="1000" u="sng" dirty="0">
+              <a:solidFill>
+                <a:schemeClr val="tx1">
+                  <a:lumMod val="75000"/>
+                  <a:lumOff val="25000"/>
+                </a:schemeClr>
+              </a:solidFill>
+              <a:latin typeface="Calibri Light" panose="020F0302020204030204" pitchFamily="34" charset="0"/>
+              <a:cs typeface="Calibri Light" panose="020F0302020204030204" pitchFamily="34" charset="0"/>
+            </a:endParaRPr>
           </a:p>
         </p:txBody>
       </p:sp>
       <p:sp>
         <p:nvSpPr>
-          <p:cNvPr id="25" name="Rectangle 24">
+          <p:cNvPr id="30" name="Rectangle 29">
             <a:extLst>
               <a:ext uri="{FF2B5EF4-FFF2-40B4-BE49-F238E27FC236}">
                 <a16:creationId xmlns:a16="http://schemas.microsoft.com/office/drawing/2014/main" id="{11D0BEA8-4C97-735F-B454-B20FE6FD6664}"/>
@@ -9161,8 +9701,8 @@
         </p:nvSpPr>
         <p:spPr>
           <a:xfrm>
-            <a:off x="-65904" y="560685"/>
-            <a:ext cx="360000" cy="1285103"/>
+            <a:off x="-65904" y="1019257"/>
+            <a:ext cx="360000" cy="1167935"/>
           </a:xfrm>
           <a:prstGeom prst="rect">
             <a:avLst/>
@@ -9237,7 +9777,7 @@
       </p:sp>
       <p:sp>
         <p:nvSpPr>
-          <p:cNvPr id="26" name="Rectangle 25">
+          <p:cNvPr id="33" name="Rectangle 32">
             <a:extLst>
               <a:ext uri="{FF2B5EF4-FFF2-40B4-BE49-F238E27FC236}">
                 <a16:creationId xmlns:a16="http://schemas.microsoft.com/office/drawing/2014/main" id="{C958D7B8-BC29-7508-F405-77D6128B8AFF}"/>
@@ -9249,8 +9789,8 @@
         </p:nvSpPr>
         <p:spPr>
           <a:xfrm>
-            <a:off x="-65904" y="2069288"/>
-            <a:ext cx="360000" cy="1345818"/>
+            <a:off x="-65904" y="2299485"/>
+            <a:ext cx="360000" cy="1167935"/>
           </a:xfrm>
           <a:prstGeom prst="rect">
             <a:avLst/>
@@ -9323,153 +9863,9 @@
           </a:p>
         </p:txBody>
       </p:sp>
-      <p:pic>
-        <p:nvPicPr>
-          <p:cNvPr id="27" name="Picture 26" descr="A graph of a number of objects&#10;&#10;AI-generated content may be incorrect.">
-            <a:extLst>
-              <a:ext uri="{FF2B5EF4-FFF2-40B4-BE49-F238E27FC236}">
-                <a16:creationId xmlns:a16="http://schemas.microsoft.com/office/drawing/2014/main" id="{F7AD1909-E98D-CDEB-AE43-02F2B49403B0}"/>
-              </a:ext>
-            </a:extLst>
-          </p:cNvPr>
-          <p:cNvPicPr>
-            <a:picLocks noChangeAspect="1"/>
-          </p:cNvPicPr>
-          <p:nvPr/>
-        </p:nvPicPr>
-        <p:blipFill>
-          <a:blip r:embed="rId2">
-            <a:extLst>
-              <a:ext uri="{28A0092B-C50C-407E-A947-70E740481C1C}">
-                <a14:useLocalDpi xmlns:a14="http://schemas.microsoft.com/office/drawing/2010/main" val="0"/>
-              </a:ext>
-            </a:extLst>
-          </a:blip>
-          <a:stretch>
-            <a:fillRect/>
-          </a:stretch>
-        </p:blipFill>
-        <p:spPr>
-          <a:xfrm>
-            <a:off x="301240" y="477863"/>
-            <a:ext cx="2025000" cy="1620000"/>
-          </a:xfrm>
-          <a:prstGeom prst="rect">
-            <a:avLst/>
-          </a:prstGeom>
-        </p:spPr>
-      </p:pic>
-      <p:pic>
-        <p:nvPicPr>
-          <p:cNvPr id="28" name="Picture 27" descr="A graph with a bar and text&#10;&#10;AI-generated content may be incorrect.">
-            <a:extLst>
-              <a:ext uri="{FF2B5EF4-FFF2-40B4-BE49-F238E27FC236}">
-                <a16:creationId xmlns:a16="http://schemas.microsoft.com/office/drawing/2014/main" id="{CB5D4612-C726-B730-FDD5-73CC7555783F}"/>
-              </a:ext>
-            </a:extLst>
-          </p:cNvPr>
-          <p:cNvPicPr>
-            <a:picLocks noChangeAspect="1"/>
-          </p:cNvPicPr>
-          <p:nvPr/>
-        </p:nvPicPr>
-        <p:blipFill>
-          <a:blip r:embed="rId3">
-            <a:extLst>
-              <a:ext uri="{28A0092B-C50C-407E-A947-70E740481C1C}">
-                <a14:useLocalDpi xmlns:a14="http://schemas.microsoft.com/office/drawing/2010/main" val="0"/>
-              </a:ext>
-            </a:extLst>
-          </a:blip>
-          <a:stretch>
-            <a:fillRect/>
-          </a:stretch>
-        </p:blipFill>
-        <p:spPr>
-          <a:xfrm>
-            <a:off x="2295035" y="477863"/>
-            <a:ext cx="2025000" cy="1620000"/>
-          </a:xfrm>
-          <a:prstGeom prst="rect">
-            <a:avLst/>
-          </a:prstGeom>
-        </p:spPr>
-      </p:pic>
-      <p:pic>
-        <p:nvPicPr>
-          <p:cNvPr id="29" name="Picture 28" descr="A graph with text and numbers&#10;&#10;AI-generated content may be incorrect.">
-            <a:extLst>
-              <a:ext uri="{FF2B5EF4-FFF2-40B4-BE49-F238E27FC236}">
-                <a16:creationId xmlns:a16="http://schemas.microsoft.com/office/drawing/2014/main" id="{1A26CCA2-39B6-0C83-F63D-DAF1B1F1BF22}"/>
-              </a:ext>
-            </a:extLst>
-          </p:cNvPr>
-          <p:cNvPicPr>
-            <a:picLocks noChangeAspect="1"/>
-          </p:cNvPicPr>
-          <p:nvPr/>
-        </p:nvPicPr>
-        <p:blipFill>
-          <a:blip r:embed="rId4">
-            <a:extLst>
-              <a:ext uri="{28A0092B-C50C-407E-A947-70E740481C1C}">
-                <a14:useLocalDpi xmlns:a14="http://schemas.microsoft.com/office/drawing/2010/main" val="0"/>
-              </a:ext>
-            </a:extLst>
-          </a:blip>
-          <a:stretch>
-            <a:fillRect/>
-          </a:stretch>
-        </p:blipFill>
-        <p:spPr>
-          <a:xfrm>
-            <a:off x="301240" y="2047181"/>
-            <a:ext cx="2025000" cy="1620000"/>
-          </a:xfrm>
-          <a:prstGeom prst="rect">
-            <a:avLst/>
-          </a:prstGeom>
-        </p:spPr>
-      </p:pic>
-      <p:pic>
-        <p:nvPicPr>
-          <p:cNvPr id="30" name="Picture 29" descr="A graph with a bar and text&#10;&#10;AI-generated content may be incorrect.">
-            <a:extLst>
-              <a:ext uri="{FF2B5EF4-FFF2-40B4-BE49-F238E27FC236}">
-                <a16:creationId xmlns:a16="http://schemas.microsoft.com/office/drawing/2014/main" id="{F702E16D-2E2F-BD83-3E7E-3F35D456A651}"/>
-              </a:ext>
-            </a:extLst>
-          </p:cNvPr>
-          <p:cNvPicPr>
-            <a:picLocks noChangeAspect="1"/>
-          </p:cNvPicPr>
-          <p:nvPr/>
-        </p:nvPicPr>
-        <p:blipFill>
-          <a:blip r:embed="rId5">
-            <a:extLst>
-              <a:ext uri="{28A0092B-C50C-407E-A947-70E740481C1C}">
-                <a14:useLocalDpi xmlns:a14="http://schemas.microsoft.com/office/drawing/2010/main" val="0"/>
-              </a:ext>
-            </a:extLst>
-          </a:blip>
-          <a:stretch>
-            <a:fillRect/>
-          </a:stretch>
-        </p:blipFill>
-        <p:spPr>
-          <a:xfrm>
-            <a:off x="2295035" y="2047181"/>
-            <a:ext cx="2025000" cy="1620000"/>
-          </a:xfrm>
-          <a:prstGeom prst="rect">
-            <a:avLst/>
-          </a:prstGeom>
-        </p:spPr>
-      </p:pic>
       <p:sp>
         <p:nvSpPr>
-          <p:cNvPr id="31" name="Rectangle 30">
+          <p:cNvPr id="34" name="Rectangle 33">
             <a:extLst>
               <a:ext uri="{FF2B5EF4-FFF2-40B4-BE49-F238E27FC236}">
                 <a16:creationId xmlns:a16="http://schemas.microsoft.com/office/drawing/2014/main" id="{204795FA-B9E8-F8C0-D0CC-0DA8FCD26B47}"/>
@@ -9481,8 +9877,8 @@
         </p:nvSpPr>
         <p:spPr>
           <a:xfrm>
-            <a:off x="840259" y="353649"/>
-            <a:ext cx="1421770" cy="180000"/>
+            <a:off x="787179" y="830711"/>
+            <a:ext cx="1237375" cy="180000"/>
           </a:xfrm>
           <a:prstGeom prst="rect">
             <a:avLst/>
@@ -9541,7 +9937,7 @@
       </p:sp>
       <p:sp>
         <p:nvSpPr>
-          <p:cNvPr id="32" name="Rectangle 31">
+          <p:cNvPr id="35" name="Rectangle 34">
             <a:extLst>
               <a:ext uri="{FF2B5EF4-FFF2-40B4-BE49-F238E27FC236}">
                 <a16:creationId xmlns:a16="http://schemas.microsoft.com/office/drawing/2014/main" id="{AEF58A4C-D7E5-1DB7-8CBA-638A2D2BAD88}"/>
@@ -9553,8 +9949,8 @@
         </p:nvSpPr>
         <p:spPr>
           <a:xfrm>
-            <a:off x="2832306" y="355747"/>
-            <a:ext cx="1421771" cy="180000"/>
+            <a:off x="2720422" y="825794"/>
+            <a:ext cx="1302629" cy="177902"/>
           </a:xfrm>
           <a:prstGeom prst="rect">
             <a:avLst/>
@@ -9607,6 +10003,538 @@
               </a:solidFill>
               <a:latin typeface="Calibri" panose="020F0502020204030204" pitchFamily="34" charset="0"/>
               <a:cs typeface="Calibri" panose="020F0502020204030204" pitchFamily="34" charset="0"/>
+            </a:endParaRPr>
+          </a:p>
+        </p:txBody>
+      </p:sp>
+      <p:sp>
+        <p:nvSpPr>
+          <p:cNvPr id="36" name="Rectangle 35">
+            <a:extLst>
+              <a:ext uri="{FF2B5EF4-FFF2-40B4-BE49-F238E27FC236}">
+                <a16:creationId xmlns:a16="http://schemas.microsoft.com/office/drawing/2014/main" id="{EF33B4CF-E544-0981-3F38-6470DAE498C6}"/>
+              </a:ext>
+            </a:extLst>
+          </p:cNvPr>
+          <p:cNvSpPr/>
+          <p:nvPr/>
+        </p:nvSpPr>
+        <p:spPr>
+          <a:xfrm>
+            <a:off x="1600897" y="535468"/>
+            <a:ext cx="493980" cy="255919"/>
+          </a:xfrm>
+          <a:prstGeom prst="rect">
+            <a:avLst/>
+          </a:prstGeom>
+          <a:noFill/>
+          <a:ln w="3175">
+            <a:noFill/>
+          </a:ln>
+        </p:spPr>
+        <p:style>
+          <a:lnRef idx="2">
+            <a:schemeClr val="accent1">
+              <a:shade val="15000"/>
+            </a:schemeClr>
+          </a:lnRef>
+          <a:fillRef idx="1">
+            <a:schemeClr val="accent1"/>
+          </a:fillRef>
+          <a:effectRef idx="0">
+            <a:schemeClr val="accent1"/>
+          </a:effectRef>
+          <a:fontRef idx="minor">
+            <a:schemeClr val="lt1"/>
+          </a:fontRef>
+        </p:style>
+        <p:txBody>
+          <a:bodyPr rtlCol="0" anchor="ctr"/>
+          <a:lstStyle/>
+          <a:p>
+            <a:pPr algn="ctr"/>
+            <a:r>
+              <a:rPr lang="en-US" sz="800" dirty="0">
+                <a:solidFill>
+                  <a:schemeClr val="tx1">
+                    <a:lumMod val="75000"/>
+                    <a:lumOff val="25000"/>
+                  </a:schemeClr>
+                </a:solidFill>
+                <a:latin typeface="Calibri Light" panose="020F0302020204030204" pitchFamily="34" charset="0"/>
+                <a:cs typeface="Calibri Light" panose="020F0302020204030204" pitchFamily="34" charset="0"/>
+              </a:rPr>
+              <a:t>mean</a:t>
+            </a:r>
+            <a:endParaRPr lang="en-GB" sz="800" dirty="0">
+              <a:solidFill>
+                <a:schemeClr val="tx1">
+                  <a:lumMod val="75000"/>
+                  <a:lumOff val="25000"/>
+                </a:schemeClr>
+              </a:solidFill>
+              <a:latin typeface="Calibri Light" panose="020F0302020204030204" pitchFamily="34" charset="0"/>
+              <a:cs typeface="Calibri Light" panose="020F0302020204030204" pitchFamily="34" charset="0"/>
+            </a:endParaRPr>
+          </a:p>
+        </p:txBody>
+      </p:sp>
+      <p:sp>
+        <p:nvSpPr>
+          <p:cNvPr id="37" name="Rectangle 36">
+            <a:extLst>
+              <a:ext uri="{FF2B5EF4-FFF2-40B4-BE49-F238E27FC236}">
+                <a16:creationId xmlns:a16="http://schemas.microsoft.com/office/drawing/2014/main" id="{15DA2081-548E-0ABB-3536-BB36B41A84BE}"/>
+              </a:ext>
+            </a:extLst>
+          </p:cNvPr>
+          <p:cNvSpPr/>
+          <p:nvPr/>
+        </p:nvSpPr>
+        <p:spPr>
+          <a:xfrm>
+            <a:off x="2357575" y="562591"/>
+            <a:ext cx="1003153" cy="185815"/>
+          </a:xfrm>
+          <a:prstGeom prst="rect">
+            <a:avLst/>
+          </a:prstGeom>
+          <a:noFill/>
+          <a:ln w="3175">
+            <a:noFill/>
+          </a:ln>
+        </p:spPr>
+        <p:style>
+          <a:lnRef idx="2">
+            <a:schemeClr val="accent1">
+              <a:shade val="15000"/>
+            </a:schemeClr>
+          </a:lnRef>
+          <a:fillRef idx="1">
+            <a:schemeClr val="accent1"/>
+          </a:fillRef>
+          <a:effectRef idx="0">
+            <a:schemeClr val="accent1"/>
+          </a:effectRef>
+          <a:fontRef idx="minor">
+            <a:schemeClr val="lt1"/>
+          </a:fontRef>
+        </p:style>
+        <p:txBody>
+          <a:bodyPr rtlCol="0" anchor="ctr"/>
+          <a:lstStyle/>
+          <a:p>
+            <a:pPr algn="ctr"/>
+            <a:r>
+              <a:rPr lang="en-US" sz="800" dirty="0">
+                <a:solidFill>
+                  <a:schemeClr val="tx1">
+                    <a:lumMod val="75000"/>
+                    <a:lumOff val="25000"/>
+                  </a:schemeClr>
+                </a:solidFill>
+                <a:latin typeface="Calibri Light" panose="020F0302020204030204" pitchFamily="34" charset="0"/>
+                <a:cs typeface="Calibri Light" panose="020F0302020204030204" pitchFamily="34" charset="0"/>
+              </a:rPr>
+              <a:t>over Optuna’s trials</a:t>
+            </a:r>
+            <a:endParaRPr lang="en-GB" sz="800" dirty="0">
+              <a:solidFill>
+                <a:schemeClr val="tx1">
+                  <a:lumMod val="75000"/>
+                  <a:lumOff val="25000"/>
+                </a:schemeClr>
+              </a:solidFill>
+              <a:latin typeface="Calibri Light" panose="020F0302020204030204" pitchFamily="34" charset="0"/>
+              <a:cs typeface="Calibri Light" panose="020F0302020204030204" pitchFamily="34" charset="0"/>
+            </a:endParaRPr>
+          </a:p>
+        </p:txBody>
+      </p:sp>
+      <p:sp>
+        <p:nvSpPr>
+          <p:cNvPr id="38" name="Rectangle 37">
+            <a:extLst>
+              <a:ext uri="{FF2B5EF4-FFF2-40B4-BE49-F238E27FC236}">
+                <a16:creationId xmlns:a16="http://schemas.microsoft.com/office/drawing/2014/main" id="{3EFAA06B-C3D4-AAD4-ACF6-E55FA1255025}"/>
+              </a:ext>
+            </a:extLst>
+          </p:cNvPr>
+          <p:cNvSpPr/>
+          <p:nvPr/>
+        </p:nvSpPr>
+        <p:spPr>
+          <a:xfrm>
+            <a:off x="1206191" y="411277"/>
+            <a:ext cx="2083938" cy="328339"/>
+          </a:xfrm>
+          <a:prstGeom prst="rect">
+            <a:avLst/>
+          </a:prstGeom>
+          <a:noFill/>
+          <a:ln w="3175">
+            <a:solidFill>
+              <a:schemeClr val="bg1">
+                <a:lumMod val="85000"/>
+              </a:schemeClr>
+            </a:solidFill>
+          </a:ln>
+        </p:spPr>
+        <p:style>
+          <a:lnRef idx="2">
+            <a:schemeClr val="accent1">
+              <a:shade val="15000"/>
+            </a:schemeClr>
+          </a:lnRef>
+          <a:fillRef idx="1">
+            <a:schemeClr val="accent1"/>
+          </a:fillRef>
+          <a:effectRef idx="0">
+            <a:schemeClr val="accent1"/>
+          </a:effectRef>
+          <a:fontRef idx="minor">
+            <a:schemeClr val="lt1"/>
+          </a:fontRef>
+        </p:style>
+        <p:txBody>
+          <a:bodyPr rtlCol="0" anchor="ctr"/>
+          <a:lstStyle/>
+          <a:p>
+            <a:pPr algn="ctr"/>
+            <a:endParaRPr lang="en-GB"/>
+          </a:p>
+        </p:txBody>
+      </p:sp>
+      <p:sp>
+        <p:nvSpPr>
+          <p:cNvPr id="39" name="Rectangle 38">
+            <a:extLst>
+              <a:ext uri="{FF2B5EF4-FFF2-40B4-BE49-F238E27FC236}">
+                <a16:creationId xmlns:a16="http://schemas.microsoft.com/office/drawing/2014/main" id="{38876436-DD07-918B-DDE2-4E4B4EE1525C}"/>
+              </a:ext>
+            </a:extLst>
+          </p:cNvPr>
+          <p:cNvSpPr/>
+          <p:nvPr/>
+        </p:nvSpPr>
+        <p:spPr>
+          <a:xfrm>
+            <a:off x="1252206" y="464603"/>
+            <a:ext cx="589841" cy="136427"/>
+          </a:xfrm>
+          <a:prstGeom prst="rect">
+            <a:avLst/>
+          </a:prstGeom>
+          <a:solidFill>
+            <a:srgbClr val="FF0066"/>
+          </a:solidFill>
+          <a:ln>
+            <a:noFill/>
+          </a:ln>
+        </p:spPr>
+        <p:style>
+          <a:lnRef idx="2">
+            <a:schemeClr val="accent1">
+              <a:shade val="15000"/>
+            </a:schemeClr>
+          </a:lnRef>
+          <a:fillRef idx="1">
+            <a:schemeClr val="accent1"/>
+          </a:fillRef>
+          <a:effectRef idx="0">
+            <a:schemeClr val="accent1"/>
+          </a:effectRef>
+          <a:fontRef idx="minor">
+            <a:schemeClr val="lt1"/>
+          </a:fontRef>
+        </p:style>
+        <p:txBody>
+          <a:bodyPr rtlCol="0" anchor="ctr"/>
+          <a:lstStyle/>
+          <a:p>
+            <a:pPr algn="ctr"/>
+            <a:endParaRPr lang="en-GB"/>
+          </a:p>
+        </p:txBody>
+      </p:sp>
+      <p:cxnSp>
+        <p:nvCxnSpPr>
+          <p:cNvPr id="40" name="Straight Connector 39">
+            <a:extLst>
+              <a:ext uri="{FF2B5EF4-FFF2-40B4-BE49-F238E27FC236}">
+                <a16:creationId xmlns:a16="http://schemas.microsoft.com/office/drawing/2014/main" id="{1B0ED484-5AE6-7483-5A00-30E83FFCB513}"/>
+              </a:ext>
+            </a:extLst>
+          </p:cNvPr>
+          <p:cNvCxnSpPr>
+            <a:cxnSpLocks/>
+          </p:cNvCxnSpPr>
+          <p:nvPr/>
+        </p:nvCxnSpPr>
+        <p:spPr>
+          <a:xfrm>
+            <a:off x="1528257" y="532816"/>
+            <a:ext cx="720000" cy="0"/>
+          </a:xfrm>
+          <a:prstGeom prst="line">
+            <a:avLst/>
+          </a:prstGeom>
+          <a:ln w="12700">
+            <a:solidFill>
+              <a:schemeClr val="tx1">
+                <a:lumMod val="75000"/>
+                <a:lumOff val="25000"/>
+              </a:schemeClr>
+            </a:solidFill>
+          </a:ln>
+        </p:spPr>
+        <p:style>
+          <a:lnRef idx="2">
+            <a:schemeClr val="accent1"/>
+          </a:lnRef>
+          <a:fillRef idx="0">
+            <a:schemeClr val="accent1"/>
+          </a:fillRef>
+          <a:effectRef idx="1">
+            <a:schemeClr val="accent1"/>
+          </a:effectRef>
+          <a:fontRef idx="minor">
+            <a:schemeClr val="tx1"/>
+          </a:fontRef>
+        </p:style>
+      </p:cxnSp>
+      <p:cxnSp>
+        <p:nvCxnSpPr>
+          <p:cNvPr id="41" name="Straight Connector 40">
+            <a:extLst>
+              <a:ext uri="{FF2B5EF4-FFF2-40B4-BE49-F238E27FC236}">
+                <a16:creationId xmlns:a16="http://schemas.microsoft.com/office/drawing/2014/main" id="{EC9F1E64-F616-B34C-EE8A-8C4F34301F3C}"/>
+              </a:ext>
+            </a:extLst>
+          </p:cNvPr>
+          <p:cNvCxnSpPr>
+            <a:cxnSpLocks/>
+          </p:cNvCxnSpPr>
+          <p:nvPr/>
+        </p:nvCxnSpPr>
+        <p:spPr>
+          <a:xfrm rot="5400000">
+            <a:off x="2212633" y="532816"/>
+            <a:ext cx="90000" cy="0"/>
+          </a:xfrm>
+          <a:prstGeom prst="line">
+            <a:avLst/>
+          </a:prstGeom>
+          <a:ln w="12700">
+            <a:solidFill>
+              <a:schemeClr val="tx1">
+                <a:lumMod val="75000"/>
+                <a:lumOff val="25000"/>
+              </a:schemeClr>
+            </a:solidFill>
+          </a:ln>
+        </p:spPr>
+        <p:style>
+          <a:lnRef idx="2">
+            <a:schemeClr val="accent1"/>
+          </a:lnRef>
+          <a:fillRef idx="0">
+            <a:schemeClr val="accent1"/>
+          </a:fillRef>
+          <a:effectRef idx="1">
+            <a:schemeClr val="accent1"/>
+          </a:effectRef>
+          <a:fontRef idx="minor">
+            <a:schemeClr val="tx1"/>
+          </a:fontRef>
+        </p:style>
+      </p:cxnSp>
+      <p:cxnSp>
+        <p:nvCxnSpPr>
+          <p:cNvPr id="42" name="Straight Connector 41">
+            <a:extLst>
+              <a:ext uri="{FF2B5EF4-FFF2-40B4-BE49-F238E27FC236}">
+                <a16:creationId xmlns:a16="http://schemas.microsoft.com/office/drawing/2014/main" id="{851394A0-0089-69D5-A0FA-C1C27FBBFB5D}"/>
+              </a:ext>
+            </a:extLst>
+          </p:cNvPr>
+          <p:cNvCxnSpPr>
+            <a:cxnSpLocks/>
+          </p:cNvCxnSpPr>
+          <p:nvPr/>
+        </p:nvCxnSpPr>
+        <p:spPr>
+          <a:xfrm rot="5400000">
+            <a:off x="1483257" y="532816"/>
+            <a:ext cx="90000" cy="0"/>
+          </a:xfrm>
+          <a:prstGeom prst="line">
+            <a:avLst/>
+          </a:prstGeom>
+          <a:ln w="12700">
+            <a:solidFill>
+              <a:schemeClr val="tx1">
+                <a:lumMod val="75000"/>
+                <a:lumOff val="25000"/>
+              </a:schemeClr>
+            </a:solidFill>
+          </a:ln>
+        </p:spPr>
+        <p:style>
+          <a:lnRef idx="2">
+            <a:schemeClr val="accent1"/>
+          </a:lnRef>
+          <a:fillRef idx="0">
+            <a:schemeClr val="accent1"/>
+          </a:fillRef>
+          <a:effectRef idx="1">
+            <a:schemeClr val="accent1"/>
+          </a:effectRef>
+          <a:fontRef idx="minor">
+            <a:schemeClr val="tx1"/>
+          </a:fontRef>
+        </p:style>
+      </p:cxnSp>
+      <p:sp>
+        <p:nvSpPr>
+          <p:cNvPr id="43" name="Rectangle 42">
+            <a:extLst>
+              <a:ext uri="{FF2B5EF4-FFF2-40B4-BE49-F238E27FC236}">
+                <a16:creationId xmlns:a16="http://schemas.microsoft.com/office/drawing/2014/main" id="{F213C0E8-B47C-2D15-4C6A-F207529E1FE3}"/>
+              </a:ext>
+            </a:extLst>
+          </p:cNvPr>
+          <p:cNvSpPr/>
+          <p:nvPr/>
+        </p:nvSpPr>
+        <p:spPr>
+          <a:xfrm>
+            <a:off x="1281075" y="535468"/>
+            <a:ext cx="493980" cy="255919"/>
+          </a:xfrm>
+          <a:prstGeom prst="rect">
+            <a:avLst/>
+          </a:prstGeom>
+          <a:noFill/>
+          <a:ln w="3175">
+            <a:noFill/>
+          </a:ln>
+        </p:spPr>
+        <p:style>
+          <a:lnRef idx="2">
+            <a:schemeClr val="accent1">
+              <a:shade val="15000"/>
+            </a:schemeClr>
+          </a:lnRef>
+          <a:fillRef idx="1">
+            <a:schemeClr val="accent1"/>
+          </a:fillRef>
+          <a:effectRef idx="0">
+            <a:schemeClr val="accent1"/>
+          </a:effectRef>
+          <a:fontRef idx="minor">
+            <a:schemeClr val="lt1"/>
+          </a:fontRef>
+        </p:style>
+        <p:txBody>
+          <a:bodyPr rtlCol="0" anchor="ctr"/>
+          <a:lstStyle/>
+          <a:p>
+            <a:pPr algn="ctr"/>
+            <a:r>
+              <a:rPr lang="en-US" sz="800" dirty="0">
+                <a:solidFill>
+                  <a:schemeClr val="tx1">
+                    <a:lumMod val="75000"/>
+                    <a:lumOff val="25000"/>
+                  </a:schemeClr>
+                </a:solidFill>
+                <a:latin typeface="Calibri Light" panose="020F0302020204030204" pitchFamily="34" charset="0"/>
+                <a:cs typeface="Calibri Light" panose="020F0302020204030204" pitchFamily="34" charset="0"/>
+              </a:rPr>
+              <a:t>min</a:t>
+            </a:r>
+            <a:endParaRPr lang="en-GB" sz="800" dirty="0">
+              <a:solidFill>
+                <a:schemeClr val="tx1">
+                  <a:lumMod val="75000"/>
+                  <a:lumOff val="25000"/>
+                </a:schemeClr>
+              </a:solidFill>
+              <a:latin typeface="Calibri Light" panose="020F0302020204030204" pitchFamily="34" charset="0"/>
+              <a:cs typeface="Calibri Light" panose="020F0302020204030204" pitchFamily="34" charset="0"/>
+            </a:endParaRPr>
+          </a:p>
+        </p:txBody>
+      </p:sp>
+      <p:sp>
+        <p:nvSpPr>
+          <p:cNvPr id="44" name="Rectangle 43">
+            <a:extLst>
+              <a:ext uri="{FF2B5EF4-FFF2-40B4-BE49-F238E27FC236}">
+                <a16:creationId xmlns:a16="http://schemas.microsoft.com/office/drawing/2014/main" id="{707EDAB5-6595-3FA3-AC11-6D8719C02089}"/>
+              </a:ext>
+            </a:extLst>
+          </p:cNvPr>
+          <p:cNvSpPr/>
+          <p:nvPr/>
+        </p:nvSpPr>
+        <p:spPr>
+          <a:xfrm>
+            <a:off x="2010205" y="535468"/>
+            <a:ext cx="493980" cy="255919"/>
+          </a:xfrm>
+          <a:prstGeom prst="rect">
+            <a:avLst/>
+          </a:prstGeom>
+          <a:noFill/>
+          <a:ln w="3175">
+            <a:noFill/>
+          </a:ln>
+        </p:spPr>
+        <p:style>
+          <a:lnRef idx="2">
+            <a:schemeClr val="accent1">
+              <a:shade val="15000"/>
+            </a:schemeClr>
+          </a:lnRef>
+          <a:fillRef idx="1">
+            <a:schemeClr val="accent1"/>
+          </a:fillRef>
+          <a:effectRef idx="0">
+            <a:schemeClr val="accent1"/>
+          </a:effectRef>
+          <a:fontRef idx="minor">
+            <a:schemeClr val="lt1"/>
+          </a:fontRef>
+        </p:style>
+        <p:txBody>
+          <a:bodyPr rtlCol="0" anchor="ctr"/>
+          <a:lstStyle/>
+          <a:p>
+            <a:pPr algn="ctr"/>
+            <a:r>
+              <a:rPr lang="en-US" sz="800" dirty="0">
+                <a:solidFill>
+                  <a:schemeClr val="tx1">
+                    <a:lumMod val="75000"/>
+                    <a:lumOff val="25000"/>
+                  </a:schemeClr>
+                </a:solidFill>
+                <a:latin typeface="Calibri Light" panose="020F0302020204030204" pitchFamily="34" charset="0"/>
+                <a:cs typeface="Calibri Light" panose="020F0302020204030204" pitchFamily="34" charset="0"/>
+              </a:rPr>
+              <a:t>max</a:t>
+            </a:r>
+            <a:endParaRPr lang="en-GB" sz="800" dirty="0">
+              <a:solidFill>
+                <a:schemeClr val="tx1">
+                  <a:lumMod val="75000"/>
+                  <a:lumOff val="25000"/>
+                </a:schemeClr>
+              </a:solidFill>
+              <a:latin typeface="Calibri Light" panose="020F0302020204030204" pitchFamily="34" charset="0"/>
+              <a:cs typeface="Calibri Light" panose="020F0302020204030204" pitchFamily="34" charset="0"/>
             </a:endParaRPr>
           </a:p>
         </p:txBody>

</xml_diff>